<commit_message>
update NONE icons on cards
</commit_message>
<xml_diff>
--- a/choice_cards/icons.pptx
+++ b/choice_cards/icons.pptx
@@ -259,7 +259,7 @@
           <a:p>
             <a:fld id="{12271627-C6DF-4804-A9E3-713ABCBEF55F}" type="datetimeFigureOut">
               <a:rPr lang="en-US" smtClean="0"/>
-              <a:t>7/14/2021</a:t>
+              <a:t>7/26/2021</a:t>
             </a:fld>
             <a:endParaRPr lang="en-US"/>
           </a:p>
@@ -457,7 +457,7 @@
           <a:p>
             <a:fld id="{12271627-C6DF-4804-A9E3-713ABCBEF55F}" type="datetimeFigureOut">
               <a:rPr lang="en-US" smtClean="0"/>
-              <a:t>7/14/2021</a:t>
+              <a:t>7/26/2021</a:t>
             </a:fld>
             <a:endParaRPr lang="en-US"/>
           </a:p>
@@ -665,7 +665,7 @@
           <a:p>
             <a:fld id="{12271627-C6DF-4804-A9E3-713ABCBEF55F}" type="datetimeFigureOut">
               <a:rPr lang="en-US" smtClean="0"/>
-              <a:t>7/14/2021</a:t>
+              <a:t>7/26/2021</a:t>
             </a:fld>
             <a:endParaRPr lang="en-US"/>
           </a:p>
@@ -863,7 +863,7 @@
           <a:p>
             <a:fld id="{12271627-C6DF-4804-A9E3-713ABCBEF55F}" type="datetimeFigureOut">
               <a:rPr lang="en-US" smtClean="0"/>
-              <a:t>7/14/2021</a:t>
+              <a:t>7/26/2021</a:t>
             </a:fld>
             <a:endParaRPr lang="en-US"/>
           </a:p>
@@ -1138,7 +1138,7 @@
           <a:p>
             <a:fld id="{12271627-C6DF-4804-A9E3-713ABCBEF55F}" type="datetimeFigureOut">
               <a:rPr lang="en-US" smtClean="0"/>
-              <a:t>7/14/2021</a:t>
+              <a:t>7/26/2021</a:t>
             </a:fld>
             <a:endParaRPr lang="en-US"/>
           </a:p>
@@ -1403,7 +1403,7 @@
           <a:p>
             <a:fld id="{12271627-C6DF-4804-A9E3-713ABCBEF55F}" type="datetimeFigureOut">
               <a:rPr lang="en-US" smtClean="0"/>
-              <a:t>7/14/2021</a:t>
+              <a:t>7/26/2021</a:t>
             </a:fld>
             <a:endParaRPr lang="en-US"/>
           </a:p>
@@ -1815,7 +1815,7 @@
           <a:p>
             <a:fld id="{12271627-C6DF-4804-A9E3-713ABCBEF55F}" type="datetimeFigureOut">
               <a:rPr lang="en-US" smtClean="0"/>
-              <a:t>7/14/2021</a:t>
+              <a:t>7/26/2021</a:t>
             </a:fld>
             <a:endParaRPr lang="en-US"/>
           </a:p>
@@ -1956,7 +1956,7 @@
           <a:p>
             <a:fld id="{12271627-C6DF-4804-A9E3-713ABCBEF55F}" type="datetimeFigureOut">
               <a:rPr lang="en-US" smtClean="0"/>
-              <a:t>7/14/2021</a:t>
+              <a:t>7/26/2021</a:t>
             </a:fld>
             <a:endParaRPr lang="en-US"/>
           </a:p>
@@ -2069,7 +2069,7 @@
           <a:p>
             <a:fld id="{12271627-C6DF-4804-A9E3-713ABCBEF55F}" type="datetimeFigureOut">
               <a:rPr lang="en-US" smtClean="0"/>
-              <a:t>7/14/2021</a:t>
+              <a:t>7/26/2021</a:t>
             </a:fld>
             <a:endParaRPr lang="en-US"/>
           </a:p>
@@ -2380,7 +2380,7 @@
           <a:p>
             <a:fld id="{12271627-C6DF-4804-A9E3-713ABCBEF55F}" type="datetimeFigureOut">
               <a:rPr lang="en-US" smtClean="0"/>
-              <a:t>7/14/2021</a:t>
+              <a:t>7/26/2021</a:t>
             </a:fld>
             <a:endParaRPr lang="en-US"/>
           </a:p>
@@ -2668,7 +2668,7 @@
           <a:p>
             <a:fld id="{12271627-C6DF-4804-A9E3-713ABCBEF55F}" type="datetimeFigureOut">
               <a:rPr lang="en-US" smtClean="0"/>
-              <a:t>7/14/2021</a:t>
+              <a:t>7/26/2021</a:t>
             </a:fld>
             <a:endParaRPr lang="en-US"/>
           </a:p>
@@ -2909,7 +2909,7 @@
           <a:p>
             <a:fld id="{12271627-C6DF-4804-A9E3-713ABCBEF55F}" type="datetimeFigureOut">
               <a:rPr lang="en-US" smtClean="0"/>
-              <a:t>7/14/2021</a:t>
+              <a:t>7/26/2021</a:t>
             </a:fld>
             <a:endParaRPr lang="en-US"/>
           </a:p>
@@ -3328,10 +3328,10 @@
       </p:grpSpPr>
       <p:grpSp>
         <p:nvGrpSpPr>
-          <p:cNvPr id="6" name="Group 5">
-            <a:extLst>
-              <a:ext uri="{FF2B5EF4-FFF2-40B4-BE49-F238E27FC236}">
-                <a16:creationId xmlns:a16="http://schemas.microsoft.com/office/drawing/2014/main" id="{7B657FCD-F71D-4853-82F4-A6F1BA6496C9}"/>
+          <p:cNvPr id="28" name="Group 27">
+            <a:extLst>
+              <a:ext uri="{FF2B5EF4-FFF2-40B4-BE49-F238E27FC236}">
+                <a16:creationId xmlns:a16="http://schemas.microsoft.com/office/drawing/2014/main" id="{FB3CD01A-7C48-4256-BA16-4F04F14D8211}"/>
               </a:ext>
             </a:extLst>
           </p:cNvPr>
@@ -3340,197 +3340,7 @@
         </p:nvGrpSpPr>
         <p:grpSpPr>
           <a:xfrm>
-            <a:off x="6626225" y="691737"/>
-            <a:ext cx="1247775" cy="914400"/>
-            <a:chOff x="7191375" y="3638550"/>
-            <a:chExt cx="1247775" cy="914400"/>
-          </a:xfrm>
-        </p:grpSpPr>
-        <p:grpSp>
-          <p:nvGrpSpPr>
-            <p:cNvPr id="4" name="Group 3">
-              <a:extLst>
-                <a:ext uri="{FF2B5EF4-FFF2-40B4-BE49-F238E27FC236}">
-                  <a16:creationId xmlns:a16="http://schemas.microsoft.com/office/drawing/2014/main" id="{C09CB7B1-7306-47BD-A4BA-C3E2C80DDD68}"/>
-                </a:ext>
-              </a:extLst>
-            </p:cNvPr>
-            <p:cNvGrpSpPr/>
-            <p:nvPr/>
-          </p:nvGrpSpPr>
-          <p:grpSpPr>
-            <a:xfrm>
-              <a:off x="7191375" y="3638550"/>
-              <a:ext cx="1247775" cy="914400"/>
-              <a:chOff x="6200775" y="3429000"/>
-              <a:chExt cx="1773283" cy="1371600"/>
-            </a:xfrm>
-          </p:grpSpPr>
-          <p:sp>
-            <p:nvSpPr>
-              <p:cNvPr id="3" name="Oval 2">
-                <a:extLst>
-                  <a:ext uri="{FF2B5EF4-FFF2-40B4-BE49-F238E27FC236}">
-                    <a16:creationId xmlns:a16="http://schemas.microsoft.com/office/drawing/2014/main" id="{01E01EBB-EC4F-4276-8AA6-08C641CD355D}"/>
-                  </a:ext>
-                </a:extLst>
-              </p:cNvPr>
-              <p:cNvSpPr>
-                <a:spLocks noChangeAspect="1"/>
-              </p:cNvSpPr>
-              <p:nvPr/>
-            </p:nvSpPr>
-            <p:spPr>
-              <a:xfrm>
-                <a:off x="6200775" y="3429000"/>
-                <a:ext cx="1773283" cy="1371600"/>
-              </a:xfrm>
-              <a:prstGeom prst="ellipse">
-                <a:avLst/>
-              </a:prstGeom>
-              <a:solidFill>
-                <a:schemeClr val="bg1"/>
-              </a:solidFill>
-              <a:ln>
-                <a:solidFill>
-                  <a:schemeClr val="tx1"/>
-                </a:solidFill>
-              </a:ln>
-            </p:spPr>
-            <p:style>
-              <a:lnRef idx="2">
-                <a:schemeClr val="accent1">
-                  <a:shade val="50000"/>
-                </a:schemeClr>
-              </a:lnRef>
-              <a:fillRef idx="1">
-                <a:schemeClr val="accent1"/>
-              </a:fillRef>
-              <a:effectRef idx="0">
-                <a:schemeClr val="accent1"/>
-              </a:effectRef>
-              <a:fontRef idx="minor">
-                <a:schemeClr val="lt1"/>
-              </a:fontRef>
-            </p:style>
-            <p:txBody>
-              <a:bodyPr rtlCol="0" anchor="ctr"/>
-              <a:lstStyle/>
-              <a:p>
-                <a:pPr algn="ctr"/>
-                <a:endParaRPr lang="en-US"/>
-              </a:p>
-            </p:txBody>
-          </p:sp>
-          <p:sp>
-            <p:nvSpPr>
-              <p:cNvPr id="30" name="Oval 29">
-                <a:extLst>
-                  <a:ext uri="{FF2B5EF4-FFF2-40B4-BE49-F238E27FC236}">
-                    <a16:creationId xmlns:a16="http://schemas.microsoft.com/office/drawing/2014/main" id="{C51B1FAD-A054-44DB-B666-82E0CC7CC796}"/>
-                  </a:ext>
-                </a:extLst>
-              </p:cNvPr>
-              <p:cNvSpPr>
-                <a:spLocks noChangeAspect="1"/>
-              </p:cNvSpPr>
-              <p:nvPr/>
-            </p:nvSpPr>
-            <p:spPr>
-              <a:xfrm>
-                <a:off x="6348548" y="3543300"/>
-                <a:ext cx="1477736" cy="1143000"/>
-              </a:xfrm>
-              <a:prstGeom prst="ellipse">
-                <a:avLst/>
-              </a:prstGeom>
-              <a:solidFill>
-                <a:schemeClr val="bg1"/>
-              </a:solidFill>
-              <a:ln>
-                <a:solidFill>
-                  <a:schemeClr val="tx1"/>
-                </a:solidFill>
-              </a:ln>
-            </p:spPr>
-            <p:style>
-              <a:lnRef idx="2">
-                <a:schemeClr val="accent1">
-                  <a:shade val="50000"/>
-                </a:schemeClr>
-              </a:lnRef>
-              <a:fillRef idx="1">
-                <a:schemeClr val="accent1"/>
-              </a:fillRef>
-              <a:effectRef idx="0">
-                <a:schemeClr val="accent1"/>
-              </a:effectRef>
-              <a:fontRef idx="minor">
-                <a:schemeClr val="lt1"/>
-              </a:fontRef>
-            </p:style>
-            <p:txBody>
-              <a:bodyPr rtlCol="0" anchor="ctr"/>
-              <a:lstStyle/>
-              <a:p>
-                <a:pPr algn="ctr"/>
-                <a:endParaRPr lang="en-US"/>
-              </a:p>
-            </p:txBody>
-          </p:sp>
-        </p:grpSp>
-        <p:sp>
-          <p:nvSpPr>
-            <p:cNvPr id="5" name="TextBox 4">
-              <a:extLst>
-                <a:ext uri="{FF2B5EF4-FFF2-40B4-BE49-F238E27FC236}">
-                  <a16:creationId xmlns:a16="http://schemas.microsoft.com/office/drawing/2014/main" id="{BE96A131-A7B0-4669-AAFF-9E3FE48AD60F}"/>
-                </a:ext>
-              </a:extLst>
-            </p:cNvPr>
-            <p:cNvSpPr txBox="1"/>
-            <p:nvPr/>
-          </p:nvSpPr>
-          <p:spPr>
-            <a:xfrm>
-              <a:off x="7443588" y="3911084"/>
-              <a:ext cx="743348" cy="369332"/>
-            </a:xfrm>
-            <a:prstGeom prst="rect">
-              <a:avLst/>
-            </a:prstGeom>
-            <a:noFill/>
-          </p:spPr>
-          <p:txBody>
-            <a:bodyPr wrap="square" rtlCol="0">
-              <a:spAutoFit/>
-            </a:bodyPr>
-            <a:lstStyle/>
-            <a:p>
-              <a:pPr algn="ctr"/>
-              <a:r>
-                <a:rPr lang="en-US" dirty="0"/>
-                <a:t>NONE</a:t>
-              </a:r>
-            </a:p>
-          </p:txBody>
-        </p:sp>
-      </p:grpSp>
-      <p:grpSp>
-        <p:nvGrpSpPr>
-          <p:cNvPr id="28" name="Group 27">
-            <a:extLst>
-              <a:ext uri="{FF2B5EF4-FFF2-40B4-BE49-F238E27FC236}">
-                <a16:creationId xmlns:a16="http://schemas.microsoft.com/office/drawing/2014/main" id="{FB3CD01A-7C48-4256-BA16-4F04F14D8211}"/>
-              </a:ext>
-            </a:extLst>
-          </p:cNvPr>
-          <p:cNvGrpSpPr/>
-          <p:nvPr/>
-        </p:nvGrpSpPr>
-        <p:grpSpPr>
-          <a:xfrm>
-            <a:off x="8398964" y="615537"/>
+            <a:off x="1078799" y="1697495"/>
             <a:ext cx="2210086" cy="914400"/>
             <a:chOff x="4385310" y="3714750"/>
             <a:chExt cx="2210086" cy="914400"/>
@@ -3672,56 +3482,12 @@
           </p:txBody>
         </p:sp>
       </p:grpSp>
-      <p:pic>
-        <p:nvPicPr>
-          <p:cNvPr id="80" name="Picture 79">
-            <a:extLst>
-              <a:ext uri="{FF2B5EF4-FFF2-40B4-BE49-F238E27FC236}">
-                <a16:creationId xmlns:a16="http://schemas.microsoft.com/office/drawing/2014/main" id="{0A77246B-F3AB-4891-A0D8-3A2E9E8DBAC1}"/>
-              </a:ext>
-            </a:extLst>
-          </p:cNvPr>
-          <p:cNvPicPr/>
-          <p:nvPr/>
-        </p:nvPicPr>
-        <p:blipFill rotWithShape="1">
-          <a:blip r:embed="rId6">
-            <a:duotone>
-              <a:schemeClr val="accent1">
-                <a:shade val="45000"/>
-                <a:satMod val="135000"/>
-              </a:schemeClr>
-              <a:prstClr val="white"/>
-            </a:duotone>
-            <a:extLst>
-              <a:ext uri="{28A0092B-C50C-407E-A947-70E740481C1C}">
-                <a14:useLocalDpi xmlns:a14="http://schemas.microsoft.com/office/drawing/2010/main" val="0"/>
-              </a:ext>
-            </a:extLst>
-          </a:blip>
-          <a:srcRect l="9245"/>
-          <a:stretch/>
-        </p:blipFill>
-        <p:spPr bwMode="auto">
-          <a:xfrm>
-            <a:off x="7173660" y="1971897"/>
-            <a:ext cx="896252" cy="877824"/>
-          </a:xfrm>
-          <a:prstGeom prst="rect">
-            <a:avLst/>
-          </a:prstGeom>
-          <a:noFill/>
-          <a:ln>
-            <a:noFill/>
-          </a:ln>
-        </p:spPr>
-      </p:pic>
       <p:grpSp>
         <p:nvGrpSpPr>
-          <p:cNvPr id="92" name="Group 91">
-            <a:extLst>
-              <a:ext uri="{FF2B5EF4-FFF2-40B4-BE49-F238E27FC236}">
-                <a16:creationId xmlns:a16="http://schemas.microsoft.com/office/drawing/2014/main" id="{A54425D6-6DBB-4B68-B106-3C050F596650}"/>
+          <p:cNvPr id="123" name="Group 122">
+            <a:extLst>
+              <a:ext uri="{FF2B5EF4-FFF2-40B4-BE49-F238E27FC236}">
+                <a16:creationId xmlns:a16="http://schemas.microsoft.com/office/drawing/2014/main" id="{A75976A6-354D-4D01-A8E9-7273CB14D2CC}"/>
               </a:ext>
             </a:extLst>
           </p:cNvPr>
@@ -3730,503 +3496,7 @@
         </p:nvGrpSpPr>
         <p:grpSpPr>
           <a:xfrm>
-            <a:off x="8357054" y="1971897"/>
-            <a:ext cx="858234" cy="795349"/>
-            <a:chOff x="5021059" y="4315292"/>
-            <a:chExt cx="896252" cy="877824"/>
-          </a:xfrm>
-        </p:grpSpPr>
-        <p:pic>
-          <p:nvPicPr>
-            <p:cNvPr id="93" name="Picture 92">
-              <a:extLst>
-                <a:ext uri="{FF2B5EF4-FFF2-40B4-BE49-F238E27FC236}">
-                  <a16:creationId xmlns:a16="http://schemas.microsoft.com/office/drawing/2014/main" id="{00B1A052-1E81-4718-862A-F7EB81F08B89}"/>
-                </a:ext>
-              </a:extLst>
-            </p:cNvPr>
-            <p:cNvPicPr>
-              <a:picLocks noChangeAspect="1"/>
-            </p:cNvPicPr>
-            <p:nvPr/>
-          </p:nvPicPr>
-          <p:blipFill>
-            <a:blip r:embed="rId7" cstate="print">
-              <a:duotone>
-                <a:schemeClr val="accent2">
-                  <a:shade val="45000"/>
-                  <a:satMod val="135000"/>
-                </a:schemeClr>
-                <a:prstClr val="white"/>
-              </a:duotone>
-              <a:extLst>
-                <a:ext uri="{28A0092B-C50C-407E-A947-70E740481C1C}">
-                  <a14:useLocalDpi xmlns:a14="http://schemas.microsoft.com/office/drawing/2010/main" val="0"/>
-                </a:ext>
-              </a:extLst>
-            </a:blip>
-            <a:srcRect/>
-            <a:stretch>
-              <a:fillRect/>
-            </a:stretch>
-          </p:blipFill>
-          <p:spPr bwMode="auto">
-            <a:xfrm>
-              <a:off x="5477184" y="4315292"/>
-              <a:ext cx="440127" cy="486507"/>
-            </a:xfrm>
-            <a:prstGeom prst="rect">
-              <a:avLst/>
-            </a:prstGeom>
-            <a:noFill/>
-            <a:ln>
-              <a:noFill/>
-            </a:ln>
-          </p:spPr>
-        </p:pic>
-        <p:pic>
-          <p:nvPicPr>
-            <p:cNvPr id="94" name="Picture 93">
-              <a:extLst>
-                <a:ext uri="{FF2B5EF4-FFF2-40B4-BE49-F238E27FC236}">
-                  <a16:creationId xmlns:a16="http://schemas.microsoft.com/office/drawing/2014/main" id="{790C56C8-725D-420C-B0D8-BA77467F5EB5}"/>
-                </a:ext>
-              </a:extLst>
-            </p:cNvPr>
-            <p:cNvPicPr>
-              <a:picLocks noChangeAspect="1"/>
-            </p:cNvPicPr>
-            <p:nvPr/>
-          </p:nvPicPr>
-          <p:blipFill>
-            <a:blip r:embed="rId8" cstate="print">
-              <a:duotone>
-                <a:schemeClr val="accent4">
-                  <a:shade val="45000"/>
-                  <a:satMod val="135000"/>
-                </a:schemeClr>
-                <a:prstClr val="white"/>
-              </a:duotone>
-              <a:extLst>
-                <a:ext uri="{28A0092B-C50C-407E-A947-70E740481C1C}">
-                  <a14:useLocalDpi xmlns:a14="http://schemas.microsoft.com/office/drawing/2010/main" val="0"/>
-                </a:ext>
-              </a:extLst>
-            </a:blip>
-            <a:srcRect/>
-            <a:stretch>
-              <a:fillRect/>
-            </a:stretch>
-          </p:blipFill>
-          <p:spPr bwMode="auto">
-            <a:xfrm flipH="1">
-              <a:off x="5021059" y="4432511"/>
-              <a:ext cx="440701" cy="515125"/>
-            </a:xfrm>
-            <a:prstGeom prst="rect">
-              <a:avLst/>
-            </a:prstGeom>
-            <a:noFill/>
-            <a:ln>
-              <a:noFill/>
-            </a:ln>
-          </p:spPr>
-        </p:pic>
-        <p:pic>
-          <p:nvPicPr>
-            <p:cNvPr id="95" name="Picture 94">
-              <a:extLst>
-                <a:ext uri="{FF2B5EF4-FFF2-40B4-BE49-F238E27FC236}">
-                  <a16:creationId xmlns:a16="http://schemas.microsoft.com/office/drawing/2014/main" id="{EA37C7AD-DC10-40AD-B0BC-A5B35AC4218C}"/>
-                </a:ext>
-              </a:extLst>
-            </p:cNvPr>
-            <p:cNvPicPr>
-              <a:picLocks noChangeAspect="1"/>
-            </p:cNvPicPr>
-            <p:nvPr/>
-          </p:nvPicPr>
-          <p:blipFill>
-            <a:blip r:embed="rId9" cstate="print">
-              <a:duotone>
-                <a:schemeClr val="accent2">
-                  <a:shade val="45000"/>
-                  <a:satMod val="135000"/>
-                </a:schemeClr>
-                <a:prstClr val="white"/>
-              </a:duotone>
-              <a:extLst>
-                <a:ext uri="{28A0092B-C50C-407E-A947-70E740481C1C}">
-                  <a14:useLocalDpi xmlns:a14="http://schemas.microsoft.com/office/drawing/2010/main" val="0"/>
-                </a:ext>
-              </a:extLst>
-            </a:blip>
-            <a:srcRect/>
-            <a:stretch>
-              <a:fillRect/>
-            </a:stretch>
-          </p:blipFill>
-          <p:spPr bwMode="auto">
-            <a:xfrm>
-              <a:off x="5364805" y="4798823"/>
-              <a:ext cx="290357" cy="394293"/>
-            </a:xfrm>
-            <a:prstGeom prst="rect">
-              <a:avLst/>
-            </a:prstGeom>
-            <a:noFill/>
-            <a:ln>
-              <a:noFill/>
-            </a:ln>
-          </p:spPr>
-        </p:pic>
-      </p:grpSp>
-      <p:grpSp>
-        <p:nvGrpSpPr>
-          <p:cNvPr id="111" name="Group 110">
-            <a:extLst>
-              <a:ext uri="{FF2B5EF4-FFF2-40B4-BE49-F238E27FC236}">
-                <a16:creationId xmlns:a16="http://schemas.microsoft.com/office/drawing/2014/main" id="{756D2BB6-6166-46FD-A3EF-598474FFEF58}"/>
-              </a:ext>
-            </a:extLst>
-          </p:cNvPr>
-          <p:cNvGrpSpPr/>
-          <p:nvPr/>
-        </p:nvGrpSpPr>
-        <p:grpSpPr>
-          <a:xfrm>
-            <a:off x="1342043" y="2458815"/>
-            <a:ext cx="1792504" cy="1673173"/>
-            <a:chOff x="1488938" y="3150961"/>
-            <a:chExt cx="1792504" cy="1673173"/>
-          </a:xfrm>
-        </p:grpSpPr>
-        <p:grpSp>
-          <p:nvGrpSpPr>
-            <p:cNvPr id="109" name="Group 108">
-              <a:extLst>
-                <a:ext uri="{FF2B5EF4-FFF2-40B4-BE49-F238E27FC236}">
-                  <a16:creationId xmlns:a16="http://schemas.microsoft.com/office/drawing/2014/main" id="{5065DF21-C734-4AE8-AFB2-2981EA68B0F5}"/>
-                </a:ext>
-              </a:extLst>
-            </p:cNvPr>
-            <p:cNvGrpSpPr/>
-            <p:nvPr/>
-          </p:nvGrpSpPr>
-          <p:grpSpPr>
-            <a:xfrm>
-              <a:off x="1488938" y="3150961"/>
-              <a:ext cx="1792504" cy="877824"/>
-              <a:chOff x="1488938" y="3150961"/>
-              <a:chExt cx="1792504" cy="877824"/>
-            </a:xfrm>
-          </p:grpSpPr>
-          <p:pic>
-            <p:nvPicPr>
-              <p:cNvPr id="107" name="Picture 106">
-                <a:extLst>
-                  <a:ext uri="{FF2B5EF4-FFF2-40B4-BE49-F238E27FC236}">
-                    <a16:creationId xmlns:a16="http://schemas.microsoft.com/office/drawing/2014/main" id="{42D171FF-B9E6-4C73-8124-158878589170}"/>
-                  </a:ext>
-                </a:extLst>
-              </p:cNvPr>
-              <p:cNvPicPr/>
-              <p:nvPr/>
-            </p:nvPicPr>
-            <p:blipFill rotWithShape="1">
-              <a:blip r:embed="rId6">
-                <a:duotone>
-                  <a:schemeClr val="accent1">
-                    <a:shade val="45000"/>
-                    <a:satMod val="135000"/>
-                  </a:schemeClr>
-                  <a:prstClr val="white"/>
-                </a:duotone>
-                <a:extLst>
-                  <a:ext uri="{28A0092B-C50C-407E-A947-70E740481C1C}">
-                    <a14:useLocalDpi xmlns:a14="http://schemas.microsoft.com/office/drawing/2010/main" val="0"/>
-                  </a:ext>
-                </a:extLst>
-              </a:blip>
-              <a:srcRect l="9245"/>
-              <a:stretch/>
-            </p:blipFill>
-            <p:spPr bwMode="auto">
-              <a:xfrm>
-                <a:off x="1488938" y="3150961"/>
-                <a:ext cx="896252" cy="877824"/>
-              </a:xfrm>
-              <a:prstGeom prst="rect">
-                <a:avLst/>
-              </a:prstGeom>
-              <a:noFill/>
-              <a:ln>
-                <a:noFill/>
-              </a:ln>
-            </p:spPr>
-          </p:pic>
-          <p:pic>
-            <p:nvPicPr>
-              <p:cNvPr id="110" name="Picture 109">
-                <a:extLst>
-                  <a:ext uri="{FF2B5EF4-FFF2-40B4-BE49-F238E27FC236}">
-                    <a16:creationId xmlns:a16="http://schemas.microsoft.com/office/drawing/2014/main" id="{F18606A8-0D40-4329-95B0-FA205A796B76}"/>
-                  </a:ext>
-                </a:extLst>
-              </p:cNvPr>
-              <p:cNvPicPr/>
-              <p:nvPr/>
-            </p:nvPicPr>
-            <p:blipFill rotWithShape="1">
-              <a:blip r:embed="rId6">
-                <a:duotone>
-                  <a:schemeClr val="accent1">
-                    <a:shade val="45000"/>
-                    <a:satMod val="135000"/>
-                  </a:schemeClr>
-                  <a:prstClr val="white"/>
-                </a:duotone>
-                <a:extLst>
-                  <a:ext uri="{28A0092B-C50C-407E-A947-70E740481C1C}">
-                    <a14:useLocalDpi xmlns:a14="http://schemas.microsoft.com/office/drawing/2010/main" val="0"/>
-                  </a:ext>
-                </a:extLst>
-              </a:blip>
-              <a:srcRect l="9245"/>
-              <a:stretch/>
-            </p:blipFill>
-            <p:spPr bwMode="auto">
-              <a:xfrm>
-                <a:off x="2385190" y="3150961"/>
-                <a:ext cx="896252" cy="877824"/>
-              </a:xfrm>
-              <a:prstGeom prst="rect">
-                <a:avLst/>
-              </a:prstGeom>
-              <a:noFill/>
-              <a:ln>
-                <a:noFill/>
-              </a:ln>
-            </p:spPr>
-          </p:pic>
-        </p:grpSp>
-        <p:grpSp>
-          <p:nvGrpSpPr>
-            <p:cNvPr id="112" name="Group 111">
-              <a:extLst>
-                <a:ext uri="{FF2B5EF4-FFF2-40B4-BE49-F238E27FC236}">
-                  <a16:creationId xmlns:a16="http://schemas.microsoft.com/office/drawing/2014/main" id="{A1B76C6A-6046-4FD3-A626-27E9DFA8FA63}"/>
-                </a:ext>
-              </a:extLst>
-            </p:cNvPr>
-            <p:cNvGrpSpPr/>
-            <p:nvPr/>
-          </p:nvGrpSpPr>
-          <p:grpSpPr>
-            <a:xfrm>
-              <a:off x="1937064" y="4028785"/>
-              <a:ext cx="858234" cy="795349"/>
-              <a:chOff x="5021059" y="4315292"/>
-              <a:chExt cx="896252" cy="877824"/>
-            </a:xfrm>
-          </p:grpSpPr>
-          <p:pic>
-            <p:nvPicPr>
-              <p:cNvPr id="113" name="Picture 112">
-                <a:extLst>
-                  <a:ext uri="{FF2B5EF4-FFF2-40B4-BE49-F238E27FC236}">
-                    <a16:creationId xmlns:a16="http://schemas.microsoft.com/office/drawing/2014/main" id="{2284FE73-55F7-4729-8009-78B70A78D4CD}"/>
-                  </a:ext>
-                </a:extLst>
-              </p:cNvPr>
-              <p:cNvPicPr>
-                <a:picLocks noChangeAspect="1"/>
-              </p:cNvPicPr>
-              <p:nvPr/>
-            </p:nvPicPr>
-            <p:blipFill>
-              <a:blip r:embed="rId7" cstate="print">
-                <a:duotone>
-                  <a:schemeClr val="accent2">
-                    <a:shade val="45000"/>
-                    <a:satMod val="135000"/>
-                  </a:schemeClr>
-                  <a:prstClr val="white"/>
-                </a:duotone>
-                <a:extLst>
-                  <a:ext uri="{28A0092B-C50C-407E-A947-70E740481C1C}">
-                    <a14:useLocalDpi xmlns:a14="http://schemas.microsoft.com/office/drawing/2010/main" val="0"/>
-                  </a:ext>
-                </a:extLst>
-              </a:blip>
-              <a:srcRect/>
-              <a:stretch>
-                <a:fillRect/>
-              </a:stretch>
-            </p:blipFill>
-            <p:spPr bwMode="auto">
-              <a:xfrm>
-                <a:off x="5477184" y="4315292"/>
-                <a:ext cx="440127" cy="486507"/>
-              </a:xfrm>
-              <a:prstGeom prst="rect">
-                <a:avLst/>
-              </a:prstGeom>
-              <a:noFill/>
-              <a:ln>
-                <a:noFill/>
-              </a:ln>
-            </p:spPr>
-          </p:pic>
-          <p:pic>
-            <p:nvPicPr>
-              <p:cNvPr id="114" name="Picture 113">
-                <a:extLst>
-                  <a:ext uri="{FF2B5EF4-FFF2-40B4-BE49-F238E27FC236}">
-                    <a16:creationId xmlns:a16="http://schemas.microsoft.com/office/drawing/2014/main" id="{5D8B1B92-9889-44A2-89F5-750B142FBB28}"/>
-                  </a:ext>
-                </a:extLst>
-              </p:cNvPr>
-              <p:cNvPicPr>
-                <a:picLocks noChangeAspect="1"/>
-              </p:cNvPicPr>
-              <p:nvPr/>
-            </p:nvPicPr>
-            <p:blipFill>
-              <a:blip r:embed="rId8" cstate="print">
-                <a:duotone>
-                  <a:schemeClr val="accent4">
-                    <a:shade val="45000"/>
-                    <a:satMod val="135000"/>
-                  </a:schemeClr>
-                  <a:prstClr val="white"/>
-                </a:duotone>
-                <a:extLst>
-                  <a:ext uri="{28A0092B-C50C-407E-A947-70E740481C1C}">
-                    <a14:useLocalDpi xmlns:a14="http://schemas.microsoft.com/office/drawing/2010/main" val="0"/>
-                  </a:ext>
-                </a:extLst>
-              </a:blip>
-              <a:srcRect/>
-              <a:stretch>
-                <a:fillRect/>
-              </a:stretch>
-            </p:blipFill>
-            <p:spPr bwMode="auto">
-              <a:xfrm flipH="1">
-                <a:off x="5021059" y="4432511"/>
-                <a:ext cx="440701" cy="515125"/>
-              </a:xfrm>
-              <a:prstGeom prst="rect">
-                <a:avLst/>
-              </a:prstGeom>
-              <a:noFill/>
-              <a:ln>
-                <a:noFill/>
-              </a:ln>
-            </p:spPr>
-          </p:pic>
-          <p:pic>
-            <p:nvPicPr>
-              <p:cNvPr id="115" name="Picture 114">
-                <a:extLst>
-                  <a:ext uri="{FF2B5EF4-FFF2-40B4-BE49-F238E27FC236}">
-                    <a16:creationId xmlns:a16="http://schemas.microsoft.com/office/drawing/2014/main" id="{6958839A-9FB4-4A8C-BC5A-5910306D30DD}"/>
-                  </a:ext>
-                </a:extLst>
-              </p:cNvPr>
-              <p:cNvPicPr>
-                <a:picLocks noChangeAspect="1"/>
-              </p:cNvPicPr>
-              <p:nvPr/>
-            </p:nvPicPr>
-            <p:blipFill>
-              <a:blip r:embed="rId9" cstate="print">
-                <a:duotone>
-                  <a:schemeClr val="accent2">
-                    <a:shade val="45000"/>
-                    <a:satMod val="135000"/>
-                  </a:schemeClr>
-                  <a:prstClr val="white"/>
-                </a:duotone>
-                <a:extLst>
-                  <a:ext uri="{28A0092B-C50C-407E-A947-70E740481C1C}">
-                    <a14:useLocalDpi xmlns:a14="http://schemas.microsoft.com/office/drawing/2010/main" val="0"/>
-                  </a:ext>
-                </a:extLst>
-              </a:blip>
-              <a:srcRect/>
-              <a:stretch>
-                <a:fillRect/>
-              </a:stretch>
-            </p:blipFill>
-            <p:spPr bwMode="auto">
-              <a:xfrm>
-                <a:off x="5364805" y="4798823"/>
-                <a:ext cx="290357" cy="394293"/>
-              </a:xfrm>
-              <a:prstGeom prst="rect">
-                <a:avLst/>
-              </a:prstGeom>
-              <a:noFill/>
-              <a:ln>
-                <a:noFill/>
-              </a:ln>
-            </p:spPr>
-          </p:pic>
-        </p:grpSp>
-      </p:grpSp>
-      <p:pic>
-        <p:nvPicPr>
-          <p:cNvPr id="119" name="Picture 118" descr="Icon&#10;&#10;Description automatically generated">
-            <a:extLst>
-              <a:ext uri="{FF2B5EF4-FFF2-40B4-BE49-F238E27FC236}">
-                <a16:creationId xmlns:a16="http://schemas.microsoft.com/office/drawing/2014/main" id="{69ED253D-3F4A-4CF3-BA62-C1B80258D036}"/>
-              </a:ext>
-            </a:extLst>
-          </p:cNvPr>
-          <p:cNvPicPr>
-            <a:picLocks noChangeAspect="1"/>
-          </p:cNvPicPr>
-          <p:nvPr/>
-        </p:nvPicPr>
-        <p:blipFill>
-          <a:blip r:embed="rId10">
-            <a:extLst>
-              <a:ext uri="{28A0092B-C50C-407E-A947-70E740481C1C}">
-                <a14:useLocalDpi xmlns:a14="http://schemas.microsoft.com/office/drawing/2010/main" val="0"/>
-              </a:ext>
-            </a:extLst>
-          </a:blip>
-          <a:stretch>
-            <a:fillRect/>
-          </a:stretch>
-        </p:blipFill>
-        <p:spPr>
-          <a:xfrm>
-            <a:off x="9502980" y="2001615"/>
-            <a:ext cx="914400" cy="914400"/>
-          </a:xfrm>
-          <a:prstGeom prst="rect">
-            <a:avLst/>
-          </a:prstGeom>
-        </p:spPr>
-      </p:pic>
-      <p:grpSp>
-        <p:nvGrpSpPr>
-          <p:cNvPr id="123" name="Group 122">
-            <a:extLst>
-              <a:ext uri="{FF2B5EF4-FFF2-40B4-BE49-F238E27FC236}">
-                <a16:creationId xmlns:a16="http://schemas.microsoft.com/office/drawing/2014/main" id="{A75976A6-354D-4D01-A8E9-7273CB14D2CC}"/>
-              </a:ext>
-            </a:extLst>
-          </p:cNvPr>
-          <p:cNvGrpSpPr/>
-          <p:nvPr/>
-        </p:nvGrpSpPr>
-        <p:grpSpPr>
-          <a:xfrm>
-            <a:off x="1342043" y="693421"/>
+            <a:off x="9610410" y="2482132"/>
             <a:ext cx="1789777" cy="1637698"/>
             <a:chOff x="5100726" y="3589873"/>
             <a:chExt cx="1789777" cy="1637698"/>
@@ -4247,7 +3517,7 @@
             <p:nvPr/>
           </p:nvPicPr>
           <p:blipFill>
-            <a:blip r:embed="rId10">
+            <a:blip r:embed="rId6">
               <a:extLst>
                 <a:ext uri="{28A0092B-C50C-407E-A947-70E740481C1C}">
                   <a14:useLocalDpi xmlns:a14="http://schemas.microsoft.com/office/drawing/2010/main" val="0"/>
@@ -4283,7 +3553,7 @@
             <p:nvPr/>
           </p:nvPicPr>
           <p:blipFill>
-            <a:blip r:embed="rId10">
+            <a:blip r:embed="rId6">
               <a:extLst>
                 <a:ext uri="{28A0092B-C50C-407E-A947-70E740481C1C}">
                   <a14:useLocalDpi xmlns:a14="http://schemas.microsoft.com/office/drawing/2010/main" val="0"/>
@@ -4319,7 +3589,7 @@
             <p:nvPr/>
           </p:nvPicPr>
           <p:blipFill>
-            <a:blip r:embed="rId10">
+            <a:blip r:embed="rId6">
               <a:extLst>
                 <a:ext uri="{28A0092B-C50C-407E-A947-70E740481C1C}">
                   <a14:useLocalDpi xmlns:a14="http://schemas.microsoft.com/office/drawing/2010/main" val="0"/>
@@ -4355,7 +3625,7 @@
             <p:nvPr/>
           </p:nvPicPr>
           <p:blipFill>
-            <a:blip r:embed="rId10">
+            <a:blip r:embed="rId6">
               <a:extLst>
                 <a:ext uri="{28A0092B-C50C-407E-A947-70E740481C1C}">
                   <a14:useLocalDpi xmlns:a14="http://schemas.microsoft.com/office/drawing/2010/main" val="0"/>
@@ -4377,42 +3647,6 @@
           </p:spPr>
         </p:pic>
       </p:grpSp>
-      <p:pic>
-        <p:nvPicPr>
-          <p:cNvPr id="128" name="Picture 127" descr="Diagram&#10;&#10;Description automatically generated">
-            <a:extLst>
-              <a:ext uri="{FF2B5EF4-FFF2-40B4-BE49-F238E27FC236}">
-                <a16:creationId xmlns:a16="http://schemas.microsoft.com/office/drawing/2014/main" id="{841E2CB1-61D6-420B-9BDF-CE179CEF1C5C}"/>
-              </a:ext>
-            </a:extLst>
-          </p:cNvPr>
-          <p:cNvPicPr>
-            <a:picLocks noChangeAspect="1"/>
-          </p:cNvPicPr>
-          <p:nvPr/>
-        </p:nvPicPr>
-        <p:blipFill>
-          <a:blip r:embed="rId11">
-            <a:extLst>
-              <a:ext uri="{28A0092B-C50C-407E-A947-70E740481C1C}">
-                <a14:useLocalDpi xmlns:a14="http://schemas.microsoft.com/office/drawing/2010/main" val="0"/>
-              </a:ext>
-            </a:extLst>
-          </a:blip>
-          <a:stretch>
-            <a:fillRect/>
-          </a:stretch>
-        </p:blipFill>
-        <p:spPr>
-          <a:xfrm>
-            <a:off x="6074062" y="2001615"/>
-            <a:ext cx="914400" cy="914400"/>
-          </a:xfrm>
-          <a:prstGeom prst="rect">
-            <a:avLst/>
-          </a:prstGeom>
-        </p:spPr>
-      </p:pic>
       <p:grpSp>
         <p:nvGrpSpPr>
           <p:cNvPr id="1027" name="Group 1026">
@@ -4427,7 +3661,7 @@
         </p:nvGrpSpPr>
         <p:grpSpPr>
           <a:xfrm>
-            <a:off x="3419996" y="596459"/>
+            <a:off x="9504007" y="488269"/>
             <a:ext cx="1896180" cy="1862356"/>
             <a:chOff x="4887366" y="3774740"/>
             <a:chExt cx="1896180" cy="1862356"/>
@@ -4468,7 +3702,7 @@
               <p:nvPr/>
             </p:nvPicPr>
             <p:blipFill>
-              <a:blip r:embed="rId11">
+              <a:blip r:embed="rId7">
                 <a:extLst>
                   <a:ext uri="{28A0092B-C50C-407E-A947-70E740481C1C}">
                     <a14:useLocalDpi xmlns:a14="http://schemas.microsoft.com/office/drawing/2010/main" val="0"/>
@@ -4504,7 +3738,7 @@
               <p:nvPr/>
             </p:nvPicPr>
             <p:blipFill>
-              <a:blip r:embed="rId11">
+              <a:blip r:embed="rId7">
                 <a:extLst>
                   <a:ext uri="{28A0092B-C50C-407E-A947-70E740481C1C}">
                     <a14:useLocalDpi xmlns:a14="http://schemas.microsoft.com/office/drawing/2010/main" val="0"/>
@@ -4541,7 +3775,7 @@
             <p:nvPr/>
           </p:nvPicPr>
           <p:blipFill>
-            <a:blip r:embed="rId11">
+            <a:blip r:embed="rId7">
               <a:extLst>
                 <a:ext uri="{28A0092B-C50C-407E-A947-70E740481C1C}">
                   <a14:useLocalDpi xmlns:a14="http://schemas.microsoft.com/office/drawing/2010/main" val="0"/>
@@ -4577,7 +3811,7 @@
             <p:nvPr/>
           </p:nvPicPr>
           <p:blipFill>
-            <a:blip r:embed="rId11">
+            <a:blip r:embed="rId7">
               <a:extLst>
                 <a:ext uri="{28A0092B-C50C-407E-A947-70E740481C1C}">
                   <a14:useLocalDpi xmlns:a14="http://schemas.microsoft.com/office/drawing/2010/main" val="0"/>
@@ -4613,7 +3847,7 @@
         </p:nvGrpSpPr>
         <p:grpSpPr>
           <a:xfrm>
-            <a:off x="8805228" y="3526970"/>
+            <a:off x="9125436" y="4251337"/>
             <a:ext cx="2696572" cy="914400"/>
             <a:chOff x="4925214" y="3741612"/>
             <a:chExt cx="2696572" cy="914400"/>
@@ -4632,7 +3866,7 @@
             <p:nvPr/>
           </p:nvPicPr>
           <p:blipFill>
-            <a:blip r:embed="rId12">
+            <a:blip r:embed="rId8">
               <a:duotone>
                 <a:schemeClr val="accent5">
                   <a:shade val="45000"/>
@@ -4675,7 +3909,7 @@
             <p:nvPr/>
           </p:nvPicPr>
           <p:blipFill>
-            <a:blip r:embed="rId12">
+            <a:blip r:embed="rId8">
               <a:duotone>
                 <a:schemeClr val="accent5">
                   <a:shade val="45000"/>
@@ -4718,7 +3952,7 @@
             <p:nvPr/>
           </p:nvPicPr>
           <p:blipFill>
-            <a:blip r:embed="rId12">
+            <a:blip r:embed="rId8">
               <a:duotone>
                 <a:schemeClr val="accent5">
                   <a:shade val="45000"/>
@@ -4751,47 +3985,249 @@
       </p:grpSp>
       <p:pic>
         <p:nvPicPr>
-          <p:cNvPr id="46" name="Picture 45">
-            <a:extLst>
-              <a:ext uri="{FF2B5EF4-FFF2-40B4-BE49-F238E27FC236}">
-                <a16:creationId xmlns:a16="http://schemas.microsoft.com/office/drawing/2014/main" id="{93F0440D-A46E-4F44-BF34-2109FD6E88C6}"/>
-              </a:ext>
-            </a:extLst>
-          </p:cNvPr>
-          <p:cNvPicPr/>
+          <p:cNvPr id="119" name="Picture 118" descr="Icon&#10;&#10;Description automatically generated">
+            <a:extLst>
+              <a:ext uri="{FF2B5EF4-FFF2-40B4-BE49-F238E27FC236}">
+                <a16:creationId xmlns:a16="http://schemas.microsoft.com/office/drawing/2014/main" id="{69ED253D-3F4A-4CF3-BA62-C1B80258D036}"/>
+              </a:ext>
+            </a:extLst>
+          </p:cNvPr>
+          <p:cNvPicPr>
+            <a:picLocks noChangeAspect="1"/>
+          </p:cNvPicPr>
+          <p:nvPr/>
+        </p:nvPicPr>
+        <p:blipFill rotWithShape="1">
+          <a:blip r:embed="rId6">
+            <a:extLst>
+              <a:ext uri="{28A0092B-C50C-407E-A947-70E740481C1C}">
+                <a14:useLocalDpi xmlns:a14="http://schemas.microsoft.com/office/drawing/2010/main" val="0"/>
+              </a:ext>
+            </a:extLst>
+          </a:blip>
+          <a:srcRect l="-10392" t="-1" r="-5715" b="-16107"/>
+          <a:stretch/>
+        </p:blipFill>
+        <p:spPr>
+          <a:xfrm>
+            <a:off x="1386180" y="357760"/>
+            <a:ext cx="1061687" cy="1061687"/>
+          </a:xfrm>
+          <a:prstGeom prst="flowChartConnector">
+            <a:avLst/>
+          </a:prstGeom>
+        </p:spPr>
+      </p:pic>
+      <p:pic>
+        <p:nvPicPr>
+          <p:cNvPr id="128" name="Picture 127" descr="Diagram&#10;&#10;Description automatically generated">
+            <a:extLst>
+              <a:ext uri="{FF2B5EF4-FFF2-40B4-BE49-F238E27FC236}">
+                <a16:creationId xmlns:a16="http://schemas.microsoft.com/office/drawing/2014/main" id="{841E2CB1-61D6-420B-9BDF-CE179CEF1C5C}"/>
+              </a:ext>
+            </a:extLst>
+          </p:cNvPr>
+          <p:cNvPicPr>
+            <a:picLocks noChangeAspect="1"/>
+          </p:cNvPicPr>
           <p:nvPr/>
         </p:nvPicPr>
         <p:blipFill>
-          <a:blip r:embed="rId12">
-            <a:duotone>
-              <a:schemeClr val="accent5">
-                <a:shade val="45000"/>
-                <a:satMod val="135000"/>
-              </a:schemeClr>
-              <a:prstClr val="white"/>
-            </a:duotone>
+          <a:blip r:embed="rId7">
             <a:extLst>
               <a:ext uri="{28A0092B-C50C-407E-A947-70E740481C1C}">
                 <a14:useLocalDpi xmlns:a14="http://schemas.microsoft.com/office/drawing/2010/main" val="0"/>
               </a:ext>
             </a:extLst>
           </a:blip>
-          <a:srcRect/>
           <a:stretch>
             <a:fillRect/>
           </a:stretch>
         </p:blipFill>
-        <p:spPr bwMode="auto">
+        <p:spPr>
           <a:xfrm>
-            <a:off x="10609050" y="1333603"/>
+            <a:off x="477907" y="264921"/>
             <a:ext cx="914400" cy="914400"/>
           </a:xfrm>
           <a:prstGeom prst="rect">
             <a:avLst/>
           </a:prstGeom>
-          <a:noFill/>
         </p:spPr>
       </p:pic>
+      <p:grpSp>
+        <p:nvGrpSpPr>
+          <p:cNvPr id="29" name="Group 28">
+            <a:extLst>
+              <a:ext uri="{FF2B5EF4-FFF2-40B4-BE49-F238E27FC236}">
+                <a16:creationId xmlns:a16="http://schemas.microsoft.com/office/drawing/2014/main" id="{B6D5A0B3-D07B-48C1-A088-E89CD0BC2DA5}"/>
+              </a:ext>
+            </a:extLst>
+          </p:cNvPr>
+          <p:cNvGrpSpPr/>
+          <p:nvPr/>
+        </p:nvGrpSpPr>
+        <p:grpSpPr>
+          <a:xfrm>
+            <a:off x="2687993" y="357760"/>
+            <a:ext cx="914400" cy="914400"/>
+            <a:chOff x="2981790" y="2552030"/>
+            <a:chExt cx="914400" cy="914400"/>
+          </a:xfrm>
+        </p:grpSpPr>
+        <p:pic>
+          <p:nvPicPr>
+            <p:cNvPr id="46" name="Picture 45">
+              <a:extLst>
+                <a:ext uri="{FF2B5EF4-FFF2-40B4-BE49-F238E27FC236}">
+                  <a16:creationId xmlns:a16="http://schemas.microsoft.com/office/drawing/2014/main" id="{93F0440D-A46E-4F44-BF34-2109FD6E88C6}"/>
+                </a:ext>
+              </a:extLst>
+            </p:cNvPr>
+            <p:cNvPicPr/>
+            <p:nvPr/>
+          </p:nvPicPr>
+          <p:blipFill>
+            <a:blip r:embed="rId9">
+              <a:duotone>
+                <a:schemeClr val="accent5">
+                  <a:shade val="45000"/>
+                  <a:satMod val="135000"/>
+                </a:schemeClr>
+                <a:prstClr val="white"/>
+              </a:duotone>
+              <a:extLst>
+                <a:ext uri="{BEBA8EAE-BF5A-486C-A8C5-ECC9F3942E4B}">
+                  <a14:imgProps xmlns:a14="http://schemas.microsoft.com/office/drawing/2010/main">
+                    <a14:imgLayer r:embed="rId10">
+                      <a14:imgEffect>
+                        <a14:saturation sat="0"/>
+                      </a14:imgEffect>
+                    </a14:imgLayer>
+                  </a14:imgProps>
+                </a:ext>
+                <a:ext uri="{28A0092B-C50C-407E-A947-70E740481C1C}">
+                  <a14:useLocalDpi xmlns:a14="http://schemas.microsoft.com/office/drawing/2010/main" val="0"/>
+                </a:ext>
+              </a:extLst>
+            </a:blip>
+            <a:srcRect/>
+            <a:stretch>
+              <a:fillRect/>
+            </a:stretch>
+          </p:blipFill>
+          <p:spPr bwMode="auto">
+            <a:xfrm>
+              <a:off x="2981790" y="2552030"/>
+              <a:ext cx="914400" cy="914400"/>
+            </a:xfrm>
+            <a:prstGeom prst="rect">
+              <a:avLst/>
+            </a:prstGeom>
+            <a:noFill/>
+          </p:spPr>
+        </p:pic>
+        <p:sp>
+          <p:nvSpPr>
+            <p:cNvPr id="14" name="Flowchart: Connector 13">
+              <a:extLst>
+                <a:ext uri="{FF2B5EF4-FFF2-40B4-BE49-F238E27FC236}">
+                  <a16:creationId xmlns:a16="http://schemas.microsoft.com/office/drawing/2014/main" id="{927075B0-E6E2-40B8-BC69-1AAC98B76443}"/>
+                </a:ext>
+              </a:extLst>
+            </p:cNvPr>
+            <p:cNvSpPr/>
+            <p:nvPr/>
+          </p:nvSpPr>
+          <p:spPr>
+            <a:xfrm>
+              <a:off x="2981790" y="2552031"/>
+              <a:ext cx="914400" cy="914399"/>
+            </a:xfrm>
+            <a:prstGeom prst="flowChartConnector">
+              <a:avLst/>
+            </a:prstGeom>
+            <a:noFill/>
+            <a:ln w="57150">
+              <a:solidFill>
+                <a:srgbClr val="C00000"/>
+              </a:solidFill>
+            </a:ln>
+          </p:spPr>
+          <p:style>
+            <a:lnRef idx="2">
+              <a:schemeClr val="accent1">
+                <a:shade val="50000"/>
+              </a:schemeClr>
+            </a:lnRef>
+            <a:fillRef idx="1">
+              <a:schemeClr val="accent1"/>
+            </a:fillRef>
+            <a:effectRef idx="0">
+              <a:schemeClr val="accent1"/>
+            </a:effectRef>
+            <a:fontRef idx="minor">
+              <a:schemeClr val="lt1"/>
+            </a:fontRef>
+          </p:style>
+          <p:txBody>
+            <a:bodyPr rtlCol="0" anchor="ctr"/>
+            <a:lstStyle/>
+            <a:p>
+              <a:pPr algn="ctr"/>
+              <a:endParaRPr lang="en-US">
+                <a:solidFill>
+                  <a:srgbClr val="C00000"/>
+                </a:solidFill>
+              </a:endParaRPr>
+            </a:p>
+          </p:txBody>
+        </p:sp>
+        <p:cxnSp>
+          <p:nvCxnSpPr>
+            <p:cNvPr id="16" name="Straight Connector 15">
+              <a:extLst>
+                <a:ext uri="{FF2B5EF4-FFF2-40B4-BE49-F238E27FC236}">
+                  <a16:creationId xmlns:a16="http://schemas.microsoft.com/office/drawing/2014/main" id="{4B511A07-D0E4-4B29-B50C-819109EA7676}"/>
+                </a:ext>
+              </a:extLst>
+            </p:cNvPr>
+            <p:cNvCxnSpPr>
+              <a:cxnSpLocks/>
+              <a:stCxn id="14" idx="1"/>
+              <a:endCxn id="14" idx="5"/>
+            </p:cNvCxnSpPr>
+            <p:nvPr/>
+          </p:nvCxnSpPr>
+          <p:spPr>
+            <a:xfrm>
+              <a:off x="3115701" y="2685942"/>
+              <a:ext cx="646578" cy="646577"/>
+            </a:xfrm>
+            <a:prstGeom prst="line">
+              <a:avLst/>
+            </a:prstGeom>
+            <a:ln w="57150">
+              <a:solidFill>
+                <a:srgbClr val="C00000"/>
+              </a:solidFill>
+            </a:ln>
+          </p:spPr>
+          <p:style>
+            <a:lnRef idx="1">
+              <a:schemeClr val="accent1"/>
+            </a:lnRef>
+            <a:fillRef idx="0">
+              <a:schemeClr val="accent1"/>
+            </a:fillRef>
+            <a:effectRef idx="0">
+              <a:schemeClr val="accent1"/>
+            </a:effectRef>
+            <a:fontRef idx="minor">
+              <a:schemeClr val="tx1"/>
+            </a:fontRef>
+          </p:style>
+        </p:cxnSp>
+      </p:grpSp>
     </p:spTree>
     <p:extLst>
       <p:ext uri="{BB962C8B-B14F-4D97-AF65-F5344CB8AC3E}">

</xml_diff>

<commit_message>
update to new experiment design
</commit_message>
<xml_diff>
--- a/choice_cards/icons.pptx
+++ b/choice_cards/icons.pptx
@@ -259,7 +259,7 @@
           <a:p>
             <a:fld id="{12271627-C6DF-4804-A9E3-713ABCBEF55F}" type="datetimeFigureOut">
               <a:rPr lang="en-US" smtClean="0"/>
-              <a:t>7/26/2021</a:t>
+              <a:t>2/16/2022</a:t>
             </a:fld>
             <a:endParaRPr lang="en-US"/>
           </a:p>
@@ -457,7 +457,7 @@
           <a:p>
             <a:fld id="{12271627-C6DF-4804-A9E3-713ABCBEF55F}" type="datetimeFigureOut">
               <a:rPr lang="en-US" smtClean="0"/>
-              <a:t>7/26/2021</a:t>
+              <a:t>2/16/2022</a:t>
             </a:fld>
             <a:endParaRPr lang="en-US"/>
           </a:p>
@@ -665,7 +665,7 @@
           <a:p>
             <a:fld id="{12271627-C6DF-4804-A9E3-713ABCBEF55F}" type="datetimeFigureOut">
               <a:rPr lang="en-US" smtClean="0"/>
-              <a:t>7/26/2021</a:t>
+              <a:t>2/16/2022</a:t>
             </a:fld>
             <a:endParaRPr lang="en-US"/>
           </a:p>
@@ -863,7 +863,7 @@
           <a:p>
             <a:fld id="{12271627-C6DF-4804-A9E3-713ABCBEF55F}" type="datetimeFigureOut">
               <a:rPr lang="en-US" smtClean="0"/>
-              <a:t>7/26/2021</a:t>
+              <a:t>2/16/2022</a:t>
             </a:fld>
             <a:endParaRPr lang="en-US"/>
           </a:p>
@@ -1138,7 +1138,7 @@
           <a:p>
             <a:fld id="{12271627-C6DF-4804-A9E3-713ABCBEF55F}" type="datetimeFigureOut">
               <a:rPr lang="en-US" smtClean="0"/>
-              <a:t>7/26/2021</a:t>
+              <a:t>2/16/2022</a:t>
             </a:fld>
             <a:endParaRPr lang="en-US"/>
           </a:p>
@@ -1403,7 +1403,7 @@
           <a:p>
             <a:fld id="{12271627-C6DF-4804-A9E3-713ABCBEF55F}" type="datetimeFigureOut">
               <a:rPr lang="en-US" smtClean="0"/>
-              <a:t>7/26/2021</a:t>
+              <a:t>2/16/2022</a:t>
             </a:fld>
             <a:endParaRPr lang="en-US"/>
           </a:p>
@@ -1815,7 +1815,7 @@
           <a:p>
             <a:fld id="{12271627-C6DF-4804-A9E3-713ABCBEF55F}" type="datetimeFigureOut">
               <a:rPr lang="en-US" smtClean="0"/>
-              <a:t>7/26/2021</a:t>
+              <a:t>2/16/2022</a:t>
             </a:fld>
             <a:endParaRPr lang="en-US"/>
           </a:p>
@@ -1956,7 +1956,7 @@
           <a:p>
             <a:fld id="{12271627-C6DF-4804-A9E3-713ABCBEF55F}" type="datetimeFigureOut">
               <a:rPr lang="en-US" smtClean="0"/>
-              <a:t>7/26/2021</a:t>
+              <a:t>2/16/2022</a:t>
             </a:fld>
             <a:endParaRPr lang="en-US"/>
           </a:p>
@@ -2069,7 +2069,7 @@
           <a:p>
             <a:fld id="{12271627-C6DF-4804-A9E3-713ABCBEF55F}" type="datetimeFigureOut">
               <a:rPr lang="en-US" smtClean="0"/>
-              <a:t>7/26/2021</a:t>
+              <a:t>2/16/2022</a:t>
             </a:fld>
             <a:endParaRPr lang="en-US"/>
           </a:p>
@@ -2380,7 +2380,7 @@
           <a:p>
             <a:fld id="{12271627-C6DF-4804-A9E3-713ABCBEF55F}" type="datetimeFigureOut">
               <a:rPr lang="en-US" smtClean="0"/>
-              <a:t>7/26/2021</a:t>
+              <a:t>2/16/2022</a:t>
             </a:fld>
             <a:endParaRPr lang="en-US"/>
           </a:p>
@@ -2668,7 +2668,7 @@
           <a:p>
             <a:fld id="{12271627-C6DF-4804-A9E3-713ABCBEF55F}" type="datetimeFigureOut">
               <a:rPr lang="en-US" smtClean="0"/>
-              <a:t>7/26/2021</a:t>
+              <a:t>2/16/2022</a:t>
             </a:fld>
             <a:endParaRPr lang="en-US"/>
           </a:p>
@@ -2909,7 +2909,7 @@
           <a:p>
             <a:fld id="{12271627-C6DF-4804-A9E3-713ABCBEF55F}" type="datetimeFigureOut">
               <a:rPr lang="en-US" smtClean="0"/>
-              <a:t>7/26/2021</a:t>
+              <a:t>2/16/2022</a:t>
             </a:fld>
             <a:endParaRPr lang="en-US"/>
           </a:p>
@@ -3340,7 +3340,7 @@
         </p:nvGrpSpPr>
         <p:grpSpPr>
           <a:xfrm>
-            <a:off x="1078799" y="1697495"/>
+            <a:off x="4430576" y="398492"/>
             <a:ext cx="2210086" cy="914400"/>
             <a:chOff x="4385310" y="3714750"/>
             <a:chExt cx="2210086" cy="914400"/>
@@ -3484,10 +3484,10 @@
       </p:grpSp>
       <p:grpSp>
         <p:nvGrpSpPr>
-          <p:cNvPr id="123" name="Group 122">
-            <a:extLst>
-              <a:ext uri="{FF2B5EF4-FFF2-40B4-BE49-F238E27FC236}">
-                <a16:creationId xmlns:a16="http://schemas.microsoft.com/office/drawing/2014/main" id="{A75976A6-354D-4D01-A8E9-7273CB14D2CC}"/>
+          <p:cNvPr id="5" name="Group 4">
+            <a:extLst>
+              <a:ext uri="{FF2B5EF4-FFF2-40B4-BE49-F238E27FC236}">
+                <a16:creationId xmlns:a16="http://schemas.microsoft.com/office/drawing/2014/main" id="{42C7C036-9F15-4E85-B6E4-E6F405344E18}"/>
               </a:ext>
             </a:extLst>
           </p:cNvPr>
@@ -3496,581 +3496,9 @@
         </p:nvGrpSpPr>
         <p:grpSpPr>
           <a:xfrm>
-            <a:off x="9610410" y="2482132"/>
-            <a:ext cx="1789777" cy="1637698"/>
-            <a:chOff x="5100726" y="3589873"/>
-            <a:chExt cx="1789777" cy="1637698"/>
-          </a:xfrm>
-        </p:grpSpPr>
-        <p:pic>
-          <p:nvPicPr>
-            <p:cNvPr id="117" name="Picture 116" descr="Icon&#10;&#10;Description automatically generated">
-              <a:extLst>
-                <a:ext uri="{FF2B5EF4-FFF2-40B4-BE49-F238E27FC236}">
-                  <a16:creationId xmlns:a16="http://schemas.microsoft.com/office/drawing/2014/main" id="{3D0AFD13-86AA-4B15-AEFA-D9080292FE2D}"/>
-                </a:ext>
-              </a:extLst>
-            </p:cNvPr>
-            <p:cNvPicPr>
-              <a:picLocks noChangeAspect="1"/>
-            </p:cNvPicPr>
-            <p:nvPr/>
-          </p:nvPicPr>
-          <p:blipFill>
-            <a:blip r:embed="rId6">
-              <a:extLst>
-                <a:ext uri="{28A0092B-C50C-407E-A947-70E740481C1C}">
-                  <a14:useLocalDpi xmlns:a14="http://schemas.microsoft.com/office/drawing/2010/main" val="0"/>
-                </a:ext>
-              </a:extLst>
-            </a:blip>
-            <a:stretch>
-              <a:fillRect/>
-            </a:stretch>
-          </p:blipFill>
-          <p:spPr>
-            <a:xfrm>
-              <a:off x="5100726" y="3589873"/>
-              <a:ext cx="914400" cy="914400"/>
-            </a:xfrm>
-            <a:prstGeom prst="rect">
-              <a:avLst/>
-            </a:prstGeom>
-          </p:spPr>
-        </p:pic>
-        <p:pic>
-          <p:nvPicPr>
-            <p:cNvPr id="121" name="Picture 120" descr="Icon&#10;&#10;Description automatically generated">
-              <a:extLst>
-                <a:ext uri="{FF2B5EF4-FFF2-40B4-BE49-F238E27FC236}">
-                  <a16:creationId xmlns:a16="http://schemas.microsoft.com/office/drawing/2014/main" id="{FA91CA9A-396F-49A0-96B1-0130C81CEB2C}"/>
-                </a:ext>
-              </a:extLst>
-            </p:cNvPr>
-            <p:cNvPicPr>
-              <a:picLocks noChangeAspect="1"/>
-            </p:cNvPicPr>
-            <p:nvPr/>
-          </p:nvPicPr>
-          <p:blipFill>
-            <a:blip r:embed="rId6">
-              <a:extLst>
-                <a:ext uri="{28A0092B-C50C-407E-A947-70E740481C1C}">
-                  <a14:useLocalDpi xmlns:a14="http://schemas.microsoft.com/office/drawing/2010/main" val="0"/>
-                </a:ext>
-              </a:extLst>
-            </a:blip>
-            <a:stretch>
-              <a:fillRect/>
-            </a:stretch>
-          </p:blipFill>
-          <p:spPr>
-            <a:xfrm>
-              <a:off x="5964038" y="3589873"/>
-              <a:ext cx="914400" cy="914400"/>
-            </a:xfrm>
-            <a:prstGeom prst="rect">
-              <a:avLst/>
-            </a:prstGeom>
-          </p:spPr>
-        </p:pic>
-        <p:pic>
-          <p:nvPicPr>
-            <p:cNvPr id="122" name="Picture 121" descr="Icon&#10;&#10;Description automatically generated">
-              <a:extLst>
-                <a:ext uri="{FF2B5EF4-FFF2-40B4-BE49-F238E27FC236}">
-                  <a16:creationId xmlns:a16="http://schemas.microsoft.com/office/drawing/2014/main" id="{3BBC65FB-5071-4665-92D8-8F44D6C1BF0F}"/>
-                </a:ext>
-              </a:extLst>
-            </p:cNvPr>
-            <p:cNvPicPr>
-              <a:picLocks noChangeAspect="1"/>
-            </p:cNvPicPr>
-            <p:nvPr/>
-          </p:nvPicPr>
-          <p:blipFill>
-            <a:blip r:embed="rId6">
-              <a:extLst>
-                <a:ext uri="{28A0092B-C50C-407E-A947-70E740481C1C}">
-                  <a14:useLocalDpi xmlns:a14="http://schemas.microsoft.com/office/drawing/2010/main" val="0"/>
-                </a:ext>
-              </a:extLst>
-            </a:blip>
-            <a:stretch>
-              <a:fillRect/>
-            </a:stretch>
-          </p:blipFill>
-          <p:spPr>
-            <a:xfrm>
-              <a:off x="5100726" y="4313171"/>
-              <a:ext cx="914400" cy="914400"/>
-            </a:xfrm>
-            <a:prstGeom prst="rect">
-              <a:avLst/>
-            </a:prstGeom>
-          </p:spPr>
-        </p:pic>
-        <p:pic>
-          <p:nvPicPr>
-            <p:cNvPr id="124" name="Picture 123" descr="Icon&#10;&#10;Description automatically generated">
-              <a:extLst>
-                <a:ext uri="{FF2B5EF4-FFF2-40B4-BE49-F238E27FC236}">
-                  <a16:creationId xmlns:a16="http://schemas.microsoft.com/office/drawing/2014/main" id="{2C60C976-CE1F-47F9-A9FC-C1D9F8D7EEBD}"/>
-                </a:ext>
-              </a:extLst>
-            </p:cNvPr>
-            <p:cNvPicPr>
-              <a:picLocks noChangeAspect="1"/>
-            </p:cNvPicPr>
-            <p:nvPr/>
-          </p:nvPicPr>
-          <p:blipFill>
-            <a:blip r:embed="rId6">
-              <a:extLst>
-                <a:ext uri="{28A0092B-C50C-407E-A947-70E740481C1C}">
-                  <a14:useLocalDpi xmlns:a14="http://schemas.microsoft.com/office/drawing/2010/main" val="0"/>
-                </a:ext>
-              </a:extLst>
-            </a:blip>
-            <a:stretch>
-              <a:fillRect/>
-            </a:stretch>
-          </p:blipFill>
-          <p:spPr>
-            <a:xfrm>
-              <a:off x="5976103" y="4313171"/>
-              <a:ext cx="914400" cy="914400"/>
-            </a:xfrm>
-            <a:prstGeom prst="rect">
-              <a:avLst/>
-            </a:prstGeom>
-          </p:spPr>
-        </p:pic>
-      </p:grpSp>
-      <p:grpSp>
-        <p:nvGrpSpPr>
-          <p:cNvPr id="1027" name="Group 1026">
-            <a:extLst>
-              <a:ext uri="{FF2B5EF4-FFF2-40B4-BE49-F238E27FC236}">
-                <a16:creationId xmlns:a16="http://schemas.microsoft.com/office/drawing/2014/main" id="{1221F7F2-BE7C-4A06-A815-7A14BEA3D0E2}"/>
-              </a:ext>
-            </a:extLst>
-          </p:cNvPr>
-          <p:cNvGrpSpPr/>
-          <p:nvPr/>
-        </p:nvGrpSpPr>
-        <p:grpSpPr>
-          <a:xfrm>
-            <a:off x="9504007" y="488269"/>
-            <a:ext cx="1896180" cy="1862356"/>
-            <a:chOff x="4887366" y="3774740"/>
-            <a:chExt cx="1896180" cy="1862356"/>
-          </a:xfrm>
-        </p:grpSpPr>
-        <p:grpSp>
-          <p:nvGrpSpPr>
-            <p:cNvPr id="1024" name="Group 1023">
-              <a:extLst>
-                <a:ext uri="{FF2B5EF4-FFF2-40B4-BE49-F238E27FC236}">
-                  <a16:creationId xmlns:a16="http://schemas.microsoft.com/office/drawing/2014/main" id="{EDA66734-6A8C-4D7E-BB7E-1EBBB745BC66}"/>
-                </a:ext>
-              </a:extLst>
-            </p:cNvPr>
-            <p:cNvGrpSpPr/>
-            <p:nvPr/>
-          </p:nvGrpSpPr>
-          <p:grpSpPr>
-            <a:xfrm>
-              <a:off x="4887366" y="3774740"/>
-              <a:ext cx="1896180" cy="914400"/>
-              <a:chOff x="4887366" y="3742577"/>
-              <a:chExt cx="1896180" cy="914400"/>
-            </a:xfrm>
-          </p:grpSpPr>
-          <p:pic>
-            <p:nvPicPr>
-              <p:cNvPr id="126" name="Picture 125" descr="Diagram&#10;&#10;Description automatically generated">
-                <a:extLst>
-                  <a:ext uri="{FF2B5EF4-FFF2-40B4-BE49-F238E27FC236}">
-                    <a16:creationId xmlns:a16="http://schemas.microsoft.com/office/drawing/2014/main" id="{5AC797C2-A582-420C-BC31-877EC5DB3E70}"/>
-                  </a:ext>
-                </a:extLst>
-              </p:cNvPr>
-              <p:cNvPicPr>
-                <a:picLocks noChangeAspect="1"/>
-              </p:cNvPicPr>
-              <p:nvPr/>
-            </p:nvPicPr>
-            <p:blipFill>
-              <a:blip r:embed="rId7">
-                <a:extLst>
-                  <a:ext uri="{28A0092B-C50C-407E-A947-70E740481C1C}">
-                    <a14:useLocalDpi xmlns:a14="http://schemas.microsoft.com/office/drawing/2010/main" val="0"/>
-                  </a:ext>
-                </a:extLst>
-              </a:blip>
-              <a:stretch>
-                <a:fillRect/>
-              </a:stretch>
-            </p:blipFill>
-            <p:spPr>
-              <a:xfrm>
-                <a:off x="4887366" y="3742577"/>
-                <a:ext cx="914400" cy="914400"/>
-              </a:xfrm>
-              <a:prstGeom prst="rect">
-                <a:avLst/>
-              </a:prstGeom>
-            </p:spPr>
-          </p:pic>
-          <p:pic>
-            <p:nvPicPr>
-              <p:cNvPr id="129" name="Picture 128" descr="Diagram&#10;&#10;Description automatically generated">
-                <a:extLst>
-                  <a:ext uri="{FF2B5EF4-FFF2-40B4-BE49-F238E27FC236}">
-                    <a16:creationId xmlns:a16="http://schemas.microsoft.com/office/drawing/2014/main" id="{D07CDF3D-0C73-4CA1-8F2E-F98CAB98959C}"/>
-                  </a:ext>
-                </a:extLst>
-              </p:cNvPr>
-              <p:cNvPicPr>
-                <a:picLocks noChangeAspect="1"/>
-              </p:cNvPicPr>
-              <p:nvPr/>
-            </p:nvPicPr>
-            <p:blipFill>
-              <a:blip r:embed="rId7">
-                <a:extLst>
-                  <a:ext uri="{28A0092B-C50C-407E-A947-70E740481C1C}">
-                    <a14:useLocalDpi xmlns:a14="http://schemas.microsoft.com/office/drawing/2010/main" val="0"/>
-                  </a:ext>
-                </a:extLst>
-              </a:blip>
-              <a:stretch>
-                <a:fillRect/>
-              </a:stretch>
-            </p:blipFill>
-            <p:spPr>
-              <a:xfrm>
-                <a:off x="5869146" y="3742577"/>
-                <a:ext cx="914400" cy="914400"/>
-              </a:xfrm>
-              <a:prstGeom prst="rect">
-                <a:avLst/>
-              </a:prstGeom>
-            </p:spPr>
-          </p:pic>
-        </p:grpSp>
-        <p:pic>
-          <p:nvPicPr>
-            <p:cNvPr id="133" name="Picture 132" descr="Diagram&#10;&#10;Description automatically generated">
-              <a:extLst>
-                <a:ext uri="{FF2B5EF4-FFF2-40B4-BE49-F238E27FC236}">
-                  <a16:creationId xmlns:a16="http://schemas.microsoft.com/office/drawing/2014/main" id="{F16FA7FF-1ECE-4C3E-ADDC-D4EB6BBF9944}"/>
-                </a:ext>
-              </a:extLst>
-            </p:cNvPr>
-            <p:cNvPicPr>
-              <a:picLocks noChangeAspect="1"/>
-            </p:cNvPicPr>
-            <p:nvPr/>
-          </p:nvPicPr>
-          <p:blipFill>
-            <a:blip r:embed="rId7">
-              <a:extLst>
-                <a:ext uri="{28A0092B-C50C-407E-A947-70E740481C1C}">
-                  <a14:useLocalDpi xmlns:a14="http://schemas.microsoft.com/office/drawing/2010/main" val="0"/>
-                </a:ext>
-              </a:extLst>
-            </a:blip>
-            <a:stretch>
-              <a:fillRect/>
-            </a:stretch>
-          </p:blipFill>
-          <p:spPr>
-            <a:xfrm>
-              <a:off x="4887366" y="4722696"/>
-              <a:ext cx="914400" cy="914400"/>
-            </a:xfrm>
-            <a:prstGeom prst="rect">
-              <a:avLst/>
-            </a:prstGeom>
-          </p:spPr>
-        </p:pic>
-        <p:pic>
-          <p:nvPicPr>
-            <p:cNvPr id="135" name="Picture 134" descr="Diagram&#10;&#10;Description automatically generated">
-              <a:extLst>
-                <a:ext uri="{FF2B5EF4-FFF2-40B4-BE49-F238E27FC236}">
-                  <a16:creationId xmlns:a16="http://schemas.microsoft.com/office/drawing/2014/main" id="{D64C9E47-3FAC-4769-9475-BBE5C1B69616}"/>
-                </a:ext>
-              </a:extLst>
-            </p:cNvPr>
-            <p:cNvPicPr>
-              <a:picLocks noChangeAspect="1"/>
-            </p:cNvPicPr>
-            <p:nvPr/>
-          </p:nvPicPr>
-          <p:blipFill>
-            <a:blip r:embed="rId7">
-              <a:extLst>
-                <a:ext uri="{28A0092B-C50C-407E-A947-70E740481C1C}">
-                  <a14:useLocalDpi xmlns:a14="http://schemas.microsoft.com/office/drawing/2010/main" val="0"/>
-                </a:ext>
-              </a:extLst>
-            </a:blip>
-            <a:stretch>
-              <a:fillRect/>
-            </a:stretch>
-          </p:blipFill>
-          <p:spPr>
-            <a:xfrm>
-              <a:off x="5869146" y="4722696"/>
-              <a:ext cx="914400" cy="914400"/>
-            </a:xfrm>
-            <a:prstGeom prst="rect">
-              <a:avLst/>
-            </a:prstGeom>
-          </p:spPr>
-        </p:pic>
-      </p:grpSp>
-      <p:grpSp>
-        <p:nvGrpSpPr>
-          <p:cNvPr id="2" name="Group 1">
-            <a:extLst>
-              <a:ext uri="{FF2B5EF4-FFF2-40B4-BE49-F238E27FC236}">
-                <a16:creationId xmlns:a16="http://schemas.microsoft.com/office/drawing/2014/main" id="{21493E54-0CD0-4DEC-B855-511852406B1F}"/>
-              </a:ext>
-            </a:extLst>
-          </p:cNvPr>
-          <p:cNvGrpSpPr/>
-          <p:nvPr/>
-        </p:nvGrpSpPr>
-        <p:grpSpPr>
-          <a:xfrm>
-            <a:off x="9125436" y="4251337"/>
-            <a:ext cx="2696572" cy="914400"/>
-            <a:chOff x="4925214" y="3741612"/>
-            <a:chExt cx="2696572" cy="914400"/>
-          </a:xfrm>
-        </p:grpSpPr>
-        <p:pic>
-          <p:nvPicPr>
-            <p:cNvPr id="37" name="Picture 36">
-              <a:extLst>
-                <a:ext uri="{FF2B5EF4-FFF2-40B4-BE49-F238E27FC236}">
-                  <a16:creationId xmlns:a16="http://schemas.microsoft.com/office/drawing/2014/main" id="{096CFFBA-F795-469A-9114-B9AEDCAE53EC}"/>
-                </a:ext>
-              </a:extLst>
-            </p:cNvPr>
-            <p:cNvPicPr/>
-            <p:nvPr/>
-          </p:nvPicPr>
-          <p:blipFill>
-            <a:blip r:embed="rId8">
-              <a:duotone>
-                <a:schemeClr val="accent5">
-                  <a:shade val="45000"/>
-                  <a:satMod val="135000"/>
-                </a:schemeClr>
-                <a:prstClr val="white"/>
-              </a:duotone>
-              <a:extLst>
-                <a:ext uri="{28A0092B-C50C-407E-A947-70E740481C1C}">
-                  <a14:useLocalDpi xmlns:a14="http://schemas.microsoft.com/office/drawing/2010/main" val="0"/>
-                </a:ext>
-              </a:extLst>
-            </a:blip>
-            <a:srcRect/>
-            <a:stretch>
-              <a:fillRect/>
-            </a:stretch>
-          </p:blipFill>
-          <p:spPr bwMode="auto">
-            <a:xfrm>
-              <a:off x="4925214" y="3741612"/>
-              <a:ext cx="914400" cy="914400"/>
-            </a:xfrm>
-            <a:prstGeom prst="rect">
-              <a:avLst/>
-            </a:prstGeom>
-            <a:noFill/>
-          </p:spPr>
-        </p:pic>
-        <p:pic>
-          <p:nvPicPr>
-            <p:cNvPr id="38" name="Picture 37">
-              <a:extLst>
-                <a:ext uri="{FF2B5EF4-FFF2-40B4-BE49-F238E27FC236}">
-                  <a16:creationId xmlns:a16="http://schemas.microsoft.com/office/drawing/2014/main" id="{E5BCC0C6-5483-414B-A8B1-EE12F6F37D71}"/>
-                </a:ext>
-              </a:extLst>
-            </p:cNvPr>
-            <p:cNvPicPr/>
-            <p:nvPr/>
-          </p:nvPicPr>
-          <p:blipFill>
-            <a:blip r:embed="rId8">
-              <a:duotone>
-                <a:schemeClr val="accent5">
-                  <a:shade val="45000"/>
-                  <a:satMod val="135000"/>
-                </a:schemeClr>
-                <a:prstClr val="white"/>
-              </a:duotone>
-              <a:extLst>
-                <a:ext uri="{28A0092B-C50C-407E-A947-70E740481C1C}">
-                  <a14:useLocalDpi xmlns:a14="http://schemas.microsoft.com/office/drawing/2010/main" val="0"/>
-                </a:ext>
-              </a:extLst>
-            </a:blip>
-            <a:srcRect/>
-            <a:stretch>
-              <a:fillRect/>
-            </a:stretch>
-          </p:blipFill>
-          <p:spPr bwMode="auto">
-            <a:xfrm>
-              <a:off x="5815806" y="3741612"/>
-              <a:ext cx="914400" cy="914400"/>
-            </a:xfrm>
-            <a:prstGeom prst="rect">
-              <a:avLst/>
-            </a:prstGeom>
-            <a:noFill/>
-          </p:spPr>
-        </p:pic>
-        <p:pic>
-          <p:nvPicPr>
-            <p:cNvPr id="39" name="Picture 38">
-              <a:extLst>
-                <a:ext uri="{FF2B5EF4-FFF2-40B4-BE49-F238E27FC236}">
-                  <a16:creationId xmlns:a16="http://schemas.microsoft.com/office/drawing/2014/main" id="{0BDA2181-5489-4750-9DC3-D456B9F16A40}"/>
-                </a:ext>
-              </a:extLst>
-            </p:cNvPr>
-            <p:cNvPicPr/>
-            <p:nvPr/>
-          </p:nvPicPr>
-          <p:blipFill>
-            <a:blip r:embed="rId8">
-              <a:duotone>
-                <a:schemeClr val="accent5">
-                  <a:shade val="45000"/>
-                  <a:satMod val="135000"/>
-                </a:schemeClr>
-                <a:prstClr val="white"/>
-              </a:duotone>
-              <a:extLst>
-                <a:ext uri="{28A0092B-C50C-407E-A947-70E740481C1C}">
-                  <a14:useLocalDpi xmlns:a14="http://schemas.microsoft.com/office/drawing/2010/main" val="0"/>
-                </a:ext>
-              </a:extLst>
-            </a:blip>
-            <a:srcRect/>
-            <a:stretch>
-              <a:fillRect/>
-            </a:stretch>
-          </p:blipFill>
-          <p:spPr bwMode="auto">
-            <a:xfrm>
-              <a:off x="6707386" y="3741612"/>
-              <a:ext cx="914400" cy="914400"/>
-            </a:xfrm>
-            <a:prstGeom prst="rect">
-              <a:avLst/>
-            </a:prstGeom>
-            <a:noFill/>
-          </p:spPr>
-        </p:pic>
-      </p:grpSp>
-      <p:pic>
-        <p:nvPicPr>
-          <p:cNvPr id="119" name="Picture 118" descr="Icon&#10;&#10;Description automatically generated">
-            <a:extLst>
-              <a:ext uri="{FF2B5EF4-FFF2-40B4-BE49-F238E27FC236}">
-                <a16:creationId xmlns:a16="http://schemas.microsoft.com/office/drawing/2014/main" id="{69ED253D-3F4A-4CF3-BA62-C1B80258D036}"/>
-              </a:ext>
-            </a:extLst>
-          </p:cNvPr>
-          <p:cNvPicPr>
-            <a:picLocks noChangeAspect="1"/>
-          </p:cNvPicPr>
-          <p:nvPr/>
-        </p:nvPicPr>
-        <p:blipFill rotWithShape="1">
-          <a:blip r:embed="rId6">
-            <a:extLst>
-              <a:ext uri="{28A0092B-C50C-407E-A947-70E740481C1C}">
-                <a14:useLocalDpi xmlns:a14="http://schemas.microsoft.com/office/drawing/2010/main" val="0"/>
-              </a:ext>
-            </a:extLst>
-          </a:blip>
-          <a:srcRect l="-10392" t="-1" r="-5715" b="-16107"/>
-          <a:stretch/>
-        </p:blipFill>
-        <p:spPr>
-          <a:xfrm>
-            <a:off x="1386180" y="357760"/>
-            <a:ext cx="1061687" cy="1061687"/>
-          </a:xfrm>
-          <a:prstGeom prst="flowChartConnector">
-            <a:avLst/>
-          </a:prstGeom>
-        </p:spPr>
-      </p:pic>
-      <p:pic>
-        <p:nvPicPr>
-          <p:cNvPr id="128" name="Picture 127" descr="Diagram&#10;&#10;Description automatically generated">
-            <a:extLst>
-              <a:ext uri="{FF2B5EF4-FFF2-40B4-BE49-F238E27FC236}">
-                <a16:creationId xmlns:a16="http://schemas.microsoft.com/office/drawing/2014/main" id="{841E2CB1-61D6-420B-9BDF-CE179CEF1C5C}"/>
-              </a:ext>
-            </a:extLst>
-          </p:cNvPr>
-          <p:cNvPicPr>
-            <a:picLocks noChangeAspect="1"/>
-          </p:cNvPicPr>
-          <p:nvPr/>
-        </p:nvPicPr>
-        <p:blipFill>
-          <a:blip r:embed="rId7">
-            <a:extLst>
-              <a:ext uri="{28A0092B-C50C-407E-A947-70E740481C1C}">
-                <a14:useLocalDpi xmlns:a14="http://schemas.microsoft.com/office/drawing/2010/main" val="0"/>
-              </a:ext>
-            </a:extLst>
-          </a:blip>
-          <a:stretch>
-            <a:fillRect/>
-          </a:stretch>
-        </p:blipFill>
-        <p:spPr>
-          <a:xfrm>
-            <a:off x="477907" y="264921"/>
+            <a:off x="411461" y="349058"/>
             <a:ext cx="914400" cy="914400"/>
-          </a:xfrm>
-          <a:prstGeom prst="rect">
-            <a:avLst/>
-          </a:prstGeom>
-        </p:spPr>
-      </p:pic>
-      <p:grpSp>
-        <p:nvGrpSpPr>
-          <p:cNvPr id="29" name="Group 28">
-            <a:extLst>
-              <a:ext uri="{FF2B5EF4-FFF2-40B4-BE49-F238E27FC236}">
-                <a16:creationId xmlns:a16="http://schemas.microsoft.com/office/drawing/2014/main" id="{B6D5A0B3-D07B-48C1-A088-E89CD0BC2DA5}"/>
-              </a:ext>
-            </a:extLst>
-          </p:cNvPr>
-          <p:cNvGrpSpPr/>
-          <p:nvPr/>
-        </p:nvGrpSpPr>
-        <p:grpSpPr>
-          <a:xfrm>
-            <a:off x="2687993" y="357760"/>
-            <a:ext cx="914400" cy="914400"/>
-            <a:chOff x="2981790" y="2552030"/>
+            <a:chOff x="334613" y="264580"/>
             <a:chExt cx="914400" cy="914400"/>
           </a:xfrm>
         </p:grpSpPr>
@@ -4087,7 +3515,7 @@
             <p:nvPr/>
           </p:nvPicPr>
           <p:blipFill>
-            <a:blip r:embed="rId9">
+            <a:blip r:embed="rId6">
               <a:duotone>
                 <a:schemeClr val="accent5">
                   <a:shade val="45000"/>
@@ -4098,7 +3526,7 @@
               <a:extLst>
                 <a:ext uri="{BEBA8EAE-BF5A-486C-A8C5-ECC9F3942E4B}">
                   <a14:imgProps xmlns:a14="http://schemas.microsoft.com/office/drawing/2010/main">
-                    <a14:imgLayer r:embed="rId10">
+                    <a14:imgLayer r:embed="rId7">
                       <a14:imgEffect>
                         <a14:saturation sat="0"/>
                       </a14:imgEffect>
@@ -4117,7 +3545,7 @@
           </p:blipFill>
           <p:spPr bwMode="auto">
             <a:xfrm>
-              <a:off x="2981790" y="2552030"/>
+              <a:off x="334613" y="264580"/>
               <a:ext cx="914400" cy="914400"/>
             </a:xfrm>
             <a:prstGeom prst="rect">
@@ -4140,7 +3568,7 @@
           </p:nvSpPr>
           <p:spPr>
             <a:xfrm>
-              <a:off x="2981790" y="2552031"/>
+              <a:off x="334613" y="264581"/>
               <a:ext cx="914400" cy="914399"/>
             </a:xfrm>
             <a:prstGeom prst="flowChartConnector">
@@ -4200,7 +3628,7 @@
           </p:nvCxnSpPr>
           <p:spPr>
             <a:xfrm>
-              <a:off x="3115701" y="2685942"/>
+              <a:off x="468524" y="398492"/>
               <a:ext cx="646578" cy="646577"/>
             </a:xfrm>
             <a:prstGeom prst="line">
@@ -4227,6 +3655,1555 @@
             </a:fontRef>
           </p:style>
         </p:cxnSp>
+      </p:grpSp>
+      <p:pic>
+        <p:nvPicPr>
+          <p:cNvPr id="11" name="Graphic 10" descr="Dollar with solid fill">
+            <a:extLst>
+              <a:ext uri="{FF2B5EF4-FFF2-40B4-BE49-F238E27FC236}">
+                <a16:creationId xmlns:a16="http://schemas.microsoft.com/office/drawing/2014/main" id="{03E6B556-304F-4BA9-A8F1-1E050DF8EE56}"/>
+              </a:ext>
+            </a:extLst>
+          </p:cNvPr>
+          <p:cNvPicPr>
+            <a:picLocks noChangeAspect="1"/>
+          </p:cNvPicPr>
+          <p:nvPr/>
+        </p:nvPicPr>
+        <p:blipFill>
+          <a:blip r:embed="rId8">
+            <a:extLst>
+              <a:ext uri="{28A0092B-C50C-407E-A947-70E740481C1C}">
+                <a14:useLocalDpi xmlns:a14="http://schemas.microsoft.com/office/drawing/2010/main" val="0"/>
+              </a:ext>
+              <a:ext uri="{96DAC541-7B7A-43D3-8B79-37D633B846F1}">
+                <asvg:svgBlip xmlns:asvg="http://schemas.microsoft.com/office/drawing/2016/SVG/main" r:embed="rId9"/>
+              </a:ext>
+            </a:extLst>
+          </a:blip>
+          <a:stretch>
+            <a:fillRect/>
+          </a:stretch>
+        </p:blipFill>
+        <p:spPr>
+          <a:xfrm>
+            <a:off x="1353570" y="5663637"/>
+            <a:ext cx="914400" cy="914400"/>
+          </a:xfrm>
+          <a:prstGeom prst="rect">
+            <a:avLst/>
+          </a:prstGeom>
+        </p:spPr>
+      </p:pic>
+      <p:grpSp>
+        <p:nvGrpSpPr>
+          <p:cNvPr id="19" name="Group 18">
+            <a:extLst>
+              <a:ext uri="{FF2B5EF4-FFF2-40B4-BE49-F238E27FC236}">
+                <a16:creationId xmlns:a16="http://schemas.microsoft.com/office/drawing/2014/main" id="{8B1E1768-0921-417B-A36F-78D2047B2430}"/>
+              </a:ext>
+            </a:extLst>
+          </p:cNvPr>
+          <p:cNvGrpSpPr/>
+          <p:nvPr/>
+        </p:nvGrpSpPr>
+        <p:grpSpPr>
+          <a:xfrm>
+            <a:off x="422871" y="1496735"/>
+            <a:ext cx="914400" cy="914400"/>
+            <a:chOff x="5193010" y="4076937"/>
+            <a:chExt cx="914400" cy="914400"/>
+          </a:xfrm>
+        </p:grpSpPr>
+        <p:pic>
+          <p:nvPicPr>
+            <p:cNvPr id="33" name="Picture 32">
+              <a:extLst>
+                <a:ext uri="{FF2B5EF4-FFF2-40B4-BE49-F238E27FC236}">
+                  <a16:creationId xmlns:a16="http://schemas.microsoft.com/office/drawing/2014/main" id="{8D1C0430-3156-489D-9C88-1B23A39FEEFA}"/>
+                </a:ext>
+              </a:extLst>
+            </p:cNvPr>
+            <p:cNvPicPr/>
+            <p:nvPr/>
+          </p:nvPicPr>
+          <p:blipFill>
+            <a:blip r:embed="rId10">
+              <a:duotone>
+                <a:schemeClr val="accent6">
+                  <a:shade val="45000"/>
+                  <a:satMod val="135000"/>
+                </a:schemeClr>
+                <a:prstClr val="white"/>
+              </a:duotone>
+              <a:extLst>
+                <a:ext uri="{28A0092B-C50C-407E-A947-70E740481C1C}">
+                  <a14:useLocalDpi xmlns:a14="http://schemas.microsoft.com/office/drawing/2010/main" val="0"/>
+                </a:ext>
+              </a:extLst>
+            </a:blip>
+            <a:srcRect/>
+            <a:stretch>
+              <a:fillRect/>
+            </a:stretch>
+          </p:blipFill>
+          <p:spPr bwMode="auto">
+            <a:xfrm>
+              <a:off x="5193010" y="4076937"/>
+              <a:ext cx="914400" cy="914400"/>
+            </a:xfrm>
+            <a:prstGeom prst="rect">
+              <a:avLst/>
+            </a:prstGeom>
+            <a:noFill/>
+          </p:spPr>
+        </p:pic>
+        <p:sp>
+          <p:nvSpPr>
+            <p:cNvPr id="31" name="Flowchart: Connector 30">
+              <a:extLst>
+                <a:ext uri="{FF2B5EF4-FFF2-40B4-BE49-F238E27FC236}">
+                  <a16:creationId xmlns:a16="http://schemas.microsoft.com/office/drawing/2014/main" id="{7305DCF0-826F-4F12-A99C-DBE60E415D9A}"/>
+                </a:ext>
+              </a:extLst>
+            </p:cNvPr>
+            <p:cNvSpPr/>
+            <p:nvPr/>
+          </p:nvSpPr>
+          <p:spPr>
+            <a:xfrm>
+              <a:off x="5193010" y="4076938"/>
+              <a:ext cx="902990" cy="914399"/>
+            </a:xfrm>
+            <a:prstGeom prst="flowChartConnector">
+              <a:avLst/>
+            </a:prstGeom>
+            <a:noFill/>
+            <a:ln w="57150">
+              <a:solidFill>
+                <a:srgbClr val="C00000"/>
+              </a:solidFill>
+            </a:ln>
+          </p:spPr>
+          <p:style>
+            <a:lnRef idx="2">
+              <a:schemeClr val="accent1">
+                <a:shade val="50000"/>
+              </a:schemeClr>
+            </a:lnRef>
+            <a:fillRef idx="1">
+              <a:schemeClr val="accent1"/>
+            </a:fillRef>
+            <a:effectRef idx="0">
+              <a:schemeClr val="accent1"/>
+            </a:effectRef>
+            <a:fontRef idx="minor">
+              <a:schemeClr val="lt1"/>
+            </a:fontRef>
+          </p:style>
+          <p:txBody>
+            <a:bodyPr rtlCol="0" anchor="ctr"/>
+            <a:lstStyle/>
+            <a:p>
+              <a:pPr algn="ctr"/>
+              <a:endParaRPr lang="en-US">
+                <a:solidFill>
+                  <a:srgbClr val="C00000"/>
+                </a:solidFill>
+              </a:endParaRPr>
+            </a:p>
+          </p:txBody>
+        </p:sp>
+        <p:cxnSp>
+          <p:nvCxnSpPr>
+            <p:cNvPr id="32" name="Straight Connector 31">
+              <a:extLst>
+                <a:ext uri="{FF2B5EF4-FFF2-40B4-BE49-F238E27FC236}">
+                  <a16:creationId xmlns:a16="http://schemas.microsoft.com/office/drawing/2014/main" id="{ED78B1C4-B1B7-4611-9CA2-FE5D619765A1}"/>
+                </a:ext>
+              </a:extLst>
+            </p:cNvPr>
+            <p:cNvCxnSpPr>
+              <a:cxnSpLocks/>
+              <a:stCxn id="31" idx="1"/>
+              <a:endCxn id="31" idx="5"/>
+            </p:cNvCxnSpPr>
+            <p:nvPr/>
+          </p:nvCxnSpPr>
+          <p:spPr>
+            <a:xfrm>
+              <a:off x="5325250" y="4210849"/>
+              <a:ext cx="638510" cy="646577"/>
+            </a:xfrm>
+            <a:prstGeom prst="line">
+              <a:avLst/>
+            </a:prstGeom>
+            <a:ln w="57150">
+              <a:solidFill>
+                <a:srgbClr val="C00000"/>
+              </a:solidFill>
+            </a:ln>
+          </p:spPr>
+          <p:style>
+            <a:lnRef idx="1">
+              <a:schemeClr val="accent1"/>
+            </a:lnRef>
+            <a:fillRef idx="0">
+              <a:schemeClr val="accent1"/>
+            </a:fillRef>
+            <a:effectRef idx="0">
+              <a:schemeClr val="accent1"/>
+            </a:effectRef>
+            <a:fontRef idx="minor">
+              <a:schemeClr val="tx1"/>
+            </a:fontRef>
+          </p:style>
+        </p:cxnSp>
+      </p:grpSp>
+      <p:pic>
+        <p:nvPicPr>
+          <p:cNvPr id="4" name="Picture 3" descr="A picture containing text, night sky&#10;&#10;Description automatically generated">
+            <a:extLst>
+              <a:ext uri="{FF2B5EF4-FFF2-40B4-BE49-F238E27FC236}">
+                <a16:creationId xmlns:a16="http://schemas.microsoft.com/office/drawing/2014/main" id="{A4D47273-0E19-4E32-867D-903693C587BE}"/>
+              </a:ext>
+            </a:extLst>
+          </p:cNvPr>
+          <p:cNvPicPr>
+            <a:picLocks noChangeAspect="1"/>
+          </p:cNvPicPr>
+          <p:nvPr/>
+        </p:nvPicPr>
+        <p:blipFill>
+          <a:blip r:embed="rId11">
+            <a:duotone>
+              <a:schemeClr val="accent6">
+                <a:shade val="45000"/>
+                <a:satMod val="135000"/>
+              </a:schemeClr>
+              <a:prstClr val="white"/>
+            </a:duotone>
+            <a:extLst>
+              <a:ext uri="{28A0092B-C50C-407E-A947-70E740481C1C}">
+                <a14:useLocalDpi xmlns:a14="http://schemas.microsoft.com/office/drawing/2010/main" val="0"/>
+              </a:ext>
+            </a:extLst>
+          </a:blip>
+          <a:stretch>
+            <a:fillRect/>
+          </a:stretch>
+        </p:blipFill>
+        <p:spPr>
+          <a:xfrm>
+            <a:off x="9624264" y="5315328"/>
+            <a:ext cx="914400" cy="914400"/>
+          </a:xfrm>
+          <a:prstGeom prst="rect">
+            <a:avLst/>
+          </a:prstGeom>
+        </p:spPr>
+      </p:pic>
+      <p:pic>
+        <p:nvPicPr>
+          <p:cNvPr id="6" name="Picture 5" descr="Logo&#10;&#10;Description automatically generated">
+            <a:extLst>
+              <a:ext uri="{FF2B5EF4-FFF2-40B4-BE49-F238E27FC236}">
+                <a16:creationId xmlns:a16="http://schemas.microsoft.com/office/drawing/2014/main" id="{8712E236-41ED-41B8-9224-249A77E836E0}"/>
+              </a:ext>
+            </a:extLst>
+          </p:cNvPr>
+          <p:cNvPicPr>
+            <a:picLocks noChangeAspect="1"/>
+          </p:cNvPicPr>
+          <p:nvPr/>
+        </p:nvPicPr>
+        <p:blipFill>
+          <a:blip r:embed="rId12">
+            <a:duotone>
+              <a:prstClr val="black"/>
+              <a:schemeClr val="accent6">
+                <a:tint val="45000"/>
+                <a:satMod val="400000"/>
+              </a:schemeClr>
+            </a:duotone>
+            <a:extLst>
+              <a:ext uri="{28A0092B-C50C-407E-A947-70E740481C1C}">
+                <a14:useLocalDpi xmlns:a14="http://schemas.microsoft.com/office/drawing/2010/main" val="0"/>
+              </a:ext>
+            </a:extLst>
+          </a:blip>
+          <a:stretch>
+            <a:fillRect/>
+          </a:stretch>
+        </p:blipFill>
+        <p:spPr>
+          <a:xfrm>
+            <a:off x="10741874" y="5315328"/>
+            <a:ext cx="641259" cy="914400"/>
+          </a:xfrm>
+          <a:prstGeom prst="rect">
+            <a:avLst/>
+          </a:prstGeom>
+        </p:spPr>
+      </p:pic>
+      <p:grpSp>
+        <p:nvGrpSpPr>
+          <p:cNvPr id="3" name="Group 2">
+            <a:extLst>
+              <a:ext uri="{FF2B5EF4-FFF2-40B4-BE49-F238E27FC236}">
+                <a16:creationId xmlns:a16="http://schemas.microsoft.com/office/drawing/2014/main" id="{ABD868C5-1C6B-4C03-BBE6-D6058507C364}"/>
+              </a:ext>
+            </a:extLst>
+          </p:cNvPr>
+          <p:cNvGrpSpPr>
+            <a:grpSpLocks noChangeAspect="1"/>
+          </p:cNvGrpSpPr>
+          <p:nvPr/>
+        </p:nvGrpSpPr>
+        <p:grpSpPr>
+          <a:xfrm>
+            <a:off x="439170" y="2956969"/>
+            <a:ext cx="1904843" cy="914400"/>
+            <a:chOff x="3968418" y="2482132"/>
+            <a:chExt cx="1964369" cy="942975"/>
+          </a:xfrm>
+        </p:grpSpPr>
+        <p:grpSp>
+          <p:nvGrpSpPr>
+            <p:cNvPr id="9" name="Group 8">
+              <a:extLst>
+                <a:ext uri="{FF2B5EF4-FFF2-40B4-BE49-F238E27FC236}">
+                  <a16:creationId xmlns:a16="http://schemas.microsoft.com/office/drawing/2014/main" id="{59BBA4B2-B74C-48CC-A6F8-B26F7068B009}"/>
+                </a:ext>
+              </a:extLst>
+            </p:cNvPr>
+            <p:cNvGrpSpPr/>
+            <p:nvPr/>
+          </p:nvGrpSpPr>
+          <p:grpSpPr>
+            <a:xfrm>
+              <a:off x="3968418" y="2510707"/>
+              <a:ext cx="916766" cy="914400"/>
+              <a:chOff x="3851563" y="1558218"/>
+              <a:chExt cx="916766" cy="914400"/>
+            </a:xfrm>
+          </p:grpSpPr>
+          <p:pic>
+            <p:nvPicPr>
+              <p:cNvPr id="36" name="Picture 35" descr="A picture containing text, night sky&#10;&#10;Description automatically generated">
+                <a:extLst>
+                  <a:ext uri="{FF2B5EF4-FFF2-40B4-BE49-F238E27FC236}">
+                    <a16:creationId xmlns:a16="http://schemas.microsoft.com/office/drawing/2014/main" id="{886D2649-1EB7-4542-B868-F2144F544019}"/>
+                  </a:ext>
+                </a:extLst>
+              </p:cNvPr>
+              <p:cNvPicPr>
+                <a:picLocks noChangeAspect="1"/>
+              </p:cNvPicPr>
+              <p:nvPr/>
+            </p:nvPicPr>
+            <p:blipFill>
+              <a:blip r:embed="rId11">
+                <a:duotone>
+                  <a:schemeClr val="accent6">
+                    <a:shade val="45000"/>
+                    <a:satMod val="135000"/>
+                  </a:schemeClr>
+                  <a:prstClr val="white"/>
+                </a:duotone>
+                <a:extLst>
+                  <a:ext uri="{28A0092B-C50C-407E-A947-70E740481C1C}">
+                    <a14:useLocalDpi xmlns:a14="http://schemas.microsoft.com/office/drawing/2010/main" val="0"/>
+                  </a:ext>
+                </a:extLst>
+              </a:blip>
+              <a:stretch>
+                <a:fillRect/>
+              </a:stretch>
+            </p:blipFill>
+            <p:spPr>
+              <a:xfrm>
+                <a:off x="3851563" y="1558218"/>
+                <a:ext cx="914400" cy="914400"/>
+              </a:xfrm>
+              <a:prstGeom prst="rect">
+                <a:avLst/>
+              </a:prstGeom>
+            </p:spPr>
+          </p:pic>
+          <p:sp>
+            <p:nvSpPr>
+              <p:cNvPr id="34" name="Flowchart: Connector 33">
+                <a:extLst>
+                  <a:ext uri="{FF2B5EF4-FFF2-40B4-BE49-F238E27FC236}">
+                    <a16:creationId xmlns:a16="http://schemas.microsoft.com/office/drawing/2014/main" id="{BA9A6B83-F565-4E4C-95B1-A92BB1C71672}"/>
+                  </a:ext>
+                </a:extLst>
+              </p:cNvPr>
+              <p:cNvSpPr/>
+              <p:nvPr/>
+            </p:nvSpPr>
+            <p:spPr>
+              <a:xfrm>
+                <a:off x="3853929" y="1558219"/>
+                <a:ext cx="914400" cy="914399"/>
+              </a:xfrm>
+              <a:prstGeom prst="flowChartConnector">
+                <a:avLst/>
+              </a:prstGeom>
+              <a:noFill/>
+              <a:ln w="57150">
+                <a:solidFill>
+                  <a:srgbClr val="C00000"/>
+                </a:solidFill>
+              </a:ln>
+            </p:spPr>
+            <p:style>
+              <a:lnRef idx="2">
+                <a:schemeClr val="accent1">
+                  <a:shade val="50000"/>
+                </a:schemeClr>
+              </a:lnRef>
+              <a:fillRef idx="1">
+                <a:schemeClr val="accent1"/>
+              </a:fillRef>
+              <a:effectRef idx="0">
+                <a:schemeClr val="accent1"/>
+              </a:effectRef>
+              <a:fontRef idx="minor">
+                <a:schemeClr val="lt1"/>
+              </a:fontRef>
+            </p:style>
+            <p:txBody>
+              <a:bodyPr rtlCol="0" anchor="ctr"/>
+              <a:lstStyle/>
+              <a:p>
+                <a:pPr algn="ctr"/>
+                <a:endParaRPr lang="en-US">
+                  <a:solidFill>
+                    <a:srgbClr val="C00000"/>
+                  </a:solidFill>
+                </a:endParaRPr>
+              </a:p>
+            </p:txBody>
+          </p:sp>
+          <p:cxnSp>
+            <p:nvCxnSpPr>
+              <p:cNvPr id="35" name="Straight Connector 34">
+                <a:extLst>
+                  <a:ext uri="{FF2B5EF4-FFF2-40B4-BE49-F238E27FC236}">
+                    <a16:creationId xmlns:a16="http://schemas.microsoft.com/office/drawing/2014/main" id="{C16767A3-D62D-40D4-951C-B8C498ED3D65}"/>
+                  </a:ext>
+                </a:extLst>
+              </p:cNvPr>
+              <p:cNvCxnSpPr>
+                <a:cxnSpLocks/>
+                <a:stCxn id="34" idx="1"/>
+                <a:endCxn id="34" idx="5"/>
+              </p:cNvCxnSpPr>
+              <p:nvPr/>
+            </p:nvCxnSpPr>
+            <p:spPr>
+              <a:xfrm>
+                <a:off x="3987840" y="1692130"/>
+                <a:ext cx="646578" cy="646577"/>
+              </a:xfrm>
+              <a:prstGeom prst="line">
+                <a:avLst/>
+              </a:prstGeom>
+              <a:ln w="57150">
+                <a:solidFill>
+                  <a:srgbClr val="C00000"/>
+                </a:solidFill>
+              </a:ln>
+            </p:spPr>
+            <p:style>
+              <a:lnRef idx="1">
+                <a:schemeClr val="accent1"/>
+              </a:lnRef>
+              <a:fillRef idx="0">
+                <a:schemeClr val="accent1"/>
+              </a:fillRef>
+              <a:effectRef idx="0">
+                <a:schemeClr val="accent1"/>
+              </a:effectRef>
+              <a:fontRef idx="minor">
+                <a:schemeClr val="tx1"/>
+              </a:fontRef>
+            </p:style>
+          </p:cxnSp>
+        </p:grpSp>
+        <p:grpSp>
+          <p:nvGrpSpPr>
+            <p:cNvPr id="12" name="Group 11">
+              <a:extLst>
+                <a:ext uri="{FF2B5EF4-FFF2-40B4-BE49-F238E27FC236}">
+                  <a16:creationId xmlns:a16="http://schemas.microsoft.com/office/drawing/2014/main" id="{9C0C8B56-C77E-4B20-BBC6-EF5E659DBA99}"/>
+                </a:ext>
+              </a:extLst>
+            </p:cNvPr>
+            <p:cNvGrpSpPr/>
+            <p:nvPr/>
+          </p:nvGrpSpPr>
+          <p:grpSpPr>
+            <a:xfrm>
+              <a:off x="5018387" y="2482132"/>
+              <a:ext cx="914400" cy="942975"/>
+              <a:chOff x="3839151" y="2758676"/>
+              <a:chExt cx="914400" cy="942975"/>
+            </a:xfrm>
+          </p:grpSpPr>
+          <p:pic>
+            <p:nvPicPr>
+              <p:cNvPr id="37" name="Picture 36" descr="Logo&#10;&#10;Description automatically generated">
+                <a:extLst>
+                  <a:ext uri="{FF2B5EF4-FFF2-40B4-BE49-F238E27FC236}">
+                    <a16:creationId xmlns:a16="http://schemas.microsoft.com/office/drawing/2014/main" id="{F059F56F-9849-46D2-A465-928F25A9CDB1}"/>
+                  </a:ext>
+                </a:extLst>
+              </p:cNvPr>
+              <p:cNvPicPr>
+                <a:picLocks noChangeAspect="1"/>
+              </p:cNvPicPr>
+              <p:nvPr/>
+            </p:nvPicPr>
+            <p:blipFill>
+              <a:blip r:embed="rId12">
+                <a:duotone>
+                  <a:prstClr val="black"/>
+                  <a:schemeClr val="accent6">
+                    <a:tint val="45000"/>
+                    <a:satMod val="400000"/>
+                  </a:schemeClr>
+                </a:duotone>
+                <a:extLst>
+                  <a:ext uri="{28A0092B-C50C-407E-A947-70E740481C1C}">
+                    <a14:useLocalDpi xmlns:a14="http://schemas.microsoft.com/office/drawing/2010/main" val="0"/>
+                  </a:ext>
+                </a:extLst>
+              </a:blip>
+              <a:stretch>
+                <a:fillRect/>
+              </a:stretch>
+            </p:blipFill>
+            <p:spPr>
+              <a:xfrm>
+                <a:off x="3979089" y="2758676"/>
+                <a:ext cx="641259" cy="914400"/>
+              </a:xfrm>
+              <a:prstGeom prst="rect">
+                <a:avLst/>
+              </a:prstGeom>
+            </p:spPr>
+          </p:pic>
+          <p:sp>
+            <p:nvSpPr>
+              <p:cNvPr id="42" name="Flowchart: Connector 41">
+                <a:extLst>
+                  <a:ext uri="{FF2B5EF4-FFF2-40B4-BE49-F238E27FC236}">
+                    <a16:creationId xmlns:a16="http://schemas.microsoft.com/office/drawing/2014/main" id="{038AF0EF-5168-49C1-B395-60A3390111C6}"/>
+                  </a:ext>
+                </a:extLst>
+              </p:cNvPr>
+              <p:cNvSpPr/>
+              <p:nvPr/>
+            </p:nvSpPr>
+            <p:spPr>
+              <a:xfrm>
+                <a:off x="3839151" y="2787252"/>
+                <a:ext cx="914400" cy="914399"/>
+              </a:xfrm>
+              <a:prstGeom prst="flowChartConnector">
+                <a:avLst/>
+              </a:prstGeom>
+              <a:noFill/>
+              <a:ln w="57150">
+                <a:solidFill>
+                  <a:srgbClr val="C00000"/>
+                </a:solidFill>
+              </a:ln>
+            </p:spPr>
+            <p:style>
+              <a:lnRef idx="2">
+                <a:schemeClr val="accent1">
+                  <a:shade val="50000"/>
+                </a:schemeClr>
+              </a:lnRef>
+              <a:fillRef idx="1">
+                <a:schemeClr val="accent1"/>
+              </a:fillRef>
+              <a:effectRef idx="0">
+                <a:schemeClr val="accent1"/>
+              </a:effectRef>
+              <a:fontRef idx="minor">
+                <a:schemeClr val="lt1"/>
+              </a:fontRef>
+            </p:style>
+            <p:txBody>
+              <a:bodyPr rtlCol="0" anchor="ctr"/>
+              <a:lstStyle/>
+              <a:p>
+                <a:pPr algn="ctr"/>
+                <a:endParaRPr lang="en-US">
+                  <a:solidFill>
+                    <a:srgbClr val="C00000"/>
+                  </a:solidFill>
+                </a:endParaRPr>
+              </a:p>
+            </p:txBody>
+          </p:sp>
+          <p:cxnSp>
+            <p:nvCxnSpPr>
+              <p:cNvPr id="43" name="Straight Connector 42">
+                <a:extLst>
+                  <a:ext uri="{FF2B5EF4-FFF2-40B4-BE49-F238E27FC236}">
+                    <a16:creationId xmlns:a16="http://schemas.microsoft.com/office/drawing/2014/main" id="{07D5F853-675A-4422-916B-1D54C332ECAF}"/>
+                  </a:ext>
+                </a:extLst>
+              </p:cNvPr>
+              <p:cNvCxnSpPr>
+                <a:cxnSpLocks/>
+                <a:stCxn id="42" idx="1"/>
+                <a:endCxn id="42" idx="5"/>
+              </p:cNvCxnSpPr>
+              <p:nvPr/>
+            </p:nvCxnSpPr>
+            <p:spPr>
+              <a:xfrm>
+                <a:off x="3973062" y="2921163"/>
+                <a:ext cx="646578" cy="646577"/>
+              </a:xfrm>
+              <a:prstGeom prst="line">
+                <a:avLst/>
+              </a:prstGeom>
+              <a:ln w="57150">
+                <a:solidFill>
+                  <a:srgbClr val="C00000"/>
+                </a:solidFill>
+              </a:ln>
+            </p:spPr>
+            <p:style>
+              <a:lnRef idx="1">
+                <a:schemeClr val="accent1"/>
+              </a:lnRef>
+              <a:fillRef idx="0">
+                <a:schemeClr val="accent1"/>
+              </a:fillRef>
+              <a:effectRef idx="0">
+                <a:schemeClr val="accent1"/>
+              </a:effectRef>
+              <a:fontRef idx="minor">
+                <a:schemeClr val="tx1"/>
+              </a:fontRef>
+            </p:style>
+          </p:cxnSp>
+        </p:grpSp>
+      </p:grpSp>
+      <p:grpSp>
+        <p:nvGrpSpPr>
+          <p:cNvPr id="15" name="Group 14">
+            <a:extLst>
+              <a:ext uri="{FF2B5EF4-FFF2-40B4-BE49-F238E27FC236}">
+                <a16:creationId xmlns:a16="http://schemas.microsoft.com/office/drawing/2014/main" id="{51F0F49D-5BD9-418B-AC2F-9EC5F211EF72}"/>
+              </a:ext>
+            </a:extLst>
+          </p:cNvPr>
+          <p:cNvGrpSpPr/>
+          <p:nvPr/>
+        </p:nvGrpSpPr>
+        <p:grpSpPr>
+          <a:xfrm>
+            <a:off x="9916225" y="3358686"/>
+            <a:ext cx="1801091" cy="914400"/>
+            <a:chOff x="5089800" y="2923430"/>
+            <a:chExt cx="1801091" cy="914400"/>
+          </a:xfrm>
+        </p:grpSpPr>
+        <p:pic>
+          <p:nvPicPr>
+            <p:cNvPr id="117" name="Picture 116" descr="Icon&#10;&#10;Description automatically generated">
+              <a:extLst>
+                <a:ext uri="{FF2B5EF4-FFF2-40B4-BE49-F238E27FC236}">
+                  <a16:creationId xmlns:a16="http://schemas.microsoft.com/office/drawing/2014/main" id="{3D0AFD13-86AA-4B15-AEFA-D9080292FE2D}"/>
+                </a:ext>
+              </a:extLst>
+            </p:cNvPr>
+            <p:cNvPicPr>
+              <a:picLocks noChangeAspect="1"/>
+            </p:cNvPicPr>
+            <p:nvPr/>
+          </p:nvPicPr>
+          <p:blipFill>
+            <a:blip r:embed="rId13">
+              <a:extLst>
+                <a:ext uri="{28A0092B-C50C-407E-A947-70E740481C1C}">
+                  <a14:useLocalDpi xmlns:a14="http://schemas.microsoft.com/office/drawing/2010/main" val="0"/>
+                </a:ext>
+              </a:extLst>
+            </a:blip>
+            <a:stretch>
+              <a:fillRect/>
+            </a:stretch>
+          </p:blipFill>
+          <p:spPr>
+            <a:xfrm>
+              <a:off x="5089800" y="2923430"/>
+              <a:ext cx="914400" cy="914400"/>
+            </a:xfrm>
+            <a:prstGeom prst="rect">
+              <a:avLst/>
+            </a:prstGeom>
+          </p:spPr>
+        </p:pic>
+        <p:pic>
+          <p:nvPicPr>
+            <p:cNvPr id="44" name="Picture 43" descr="Icon&#10;&#10;Description automatically generated">
+              <a:extLst>
+                <a:ext uri="{FF2B5EF4-FFF2-40B4-BE49-F238E27FC236}">
+                  <a16:creationId xmlns:a16="http://schemas.microsoft.com/office/drawing/2014/main" id="{B17A835F-1F0A-472B-A292-6C541936C5C2}"/>
+                </a:ext>
+              </a:extLst>
+            </p:cNvPr>
+            <p:cNvPicPr>
+              <a:picLocks noChangeAspect="1"/>
+            </p:cNvPicPr>
+            <p:nvPr/>
+          </p:nvPicPr>
+          <p:blipFill>
+            <a:blip r:embed="rId13">
+              <a:extLst>
+                <a:ext uri="{28A0092B-C50C-407E-A947-70E740481C1C}">
+                  <a14:useLocalDpi xmlns:a14="http://schemas.microsoft.com/office/drawing/2010/main" val="0"/>
+                </a:ext>
+              </a:extLst>
+            </a:blip>
+            <a:stretch>
+              <a:fillRect/>
+            </a:stretch>
+          </p:blipFill>
+          <p:spPr>
+            <a:xfrm>
+              <a:off x="5976491" y="2923430"/>
+              <a:ext cx="914400" cy="914400"/>
+            </a:xfrm>
+            <a:prstGeom prst="rect">
+              <a:avLst/>
+            </a:prstGeom>
+          </p:spPr>
+        </p:pic>
+      </p:grpSp>
+      <p:grpSp>
+        <p:nvGrpSpPr>
+          <p:cNvPr id="17" name="Group 16">
+            <a:extLst>
+              <a:ext uri="{FF2B5EF4-FFF2-40B4-BE49-F238E27FC236}">
+                <a16:creationId xmlns:a16="http://schemas.microsoft.com/office/drawing/2014/main" id="{C472EA54-3407-441C-A422-9F5A510F1DC0}"/>
+              </a:ext>
+            </a:extLst>
+          </p:cNvPr>
+          <p:cNvGrpSpPr/>
+          <p:nvPr/>
+        </p:nvGrpSpPr>
+        <p:grpSpPr>
+          <a:xfrm>
+            <a:off x="308399" y="4291393"/>
+            <a:ext cx="940614" cy="914400"/>
+            <a:chOff x="145336" y="252575"/>
+            <a:chExt cx="914400" cy="914399"/>
+          </a:xfrm>
+        </p:grpSpPr>
+        <p:sp>
+          <p:nvSpPr>
+            <p:cNvPr id="40" name="Flowchart: Connector 39">
+              <a:extLst>
+                <a:ext uri="{FF2B5EF4-FFF2-40B4-BE49-F238E27FC236}">
+                  <a16:creationId xmlns:a16="http://schemas.microsoft.com/office/drawing/2014/main" id="{7F6E0AFD-6899-4F15-8A56-EABEC6903E68}"/>
+                </a:ext>
+              </a:extLst>
+            </p:cNvPr>
+            <p:cNvSpPr/>
+            <p:nvPr/>
+          </p:nvSpPr>
+          <p:spPr>
+            <a:xfrm>
+              <a:off x="145336" y="252575"/>
+              <a:ext cx="914400" cy="914399"/>
+            </a:xfrm>
+            <a:prstGeom prst="flowChartConnector">
+              <a:avLst/>
+            </a:prstGeom>
+            <a:noFill/>
+            <a:ln w="57150">
+              <a:solidFill>
+                <a:srgbClr val="C00000"/>
+              </a:solidFill>
+            </a:ln>
+          </p:spPr>
+          <p:style>
+            <a:lnRef idx="2">
+              <a:schemeClr val="accent1">
+                <a:shade val="50000"/>
+              </a:schemeClr>
+            </a:lnRef>
+            <a:fillRef idx="1">
+              <a:schemeClr val="accent1"/>
+            </a:fillRef>
+            <a:effectRef idx="0">
+              <a:schemeClr val="accent1"/>
+            </a:effectRef>
+            <a:fontRef idx="minor">
+              <a:schemeClr val="lt1"/>
+            </a:fontRef>
+          </p:style>
+          <p:txBody>
+            <a:bodyPr rtlCol="0" anchor="ctr"/>
+            <a:lstStyle/>
+            <a:p>
+              <a:pPr algn="ctr"/>
+              <a:endParaRPr lang="en-US">
+                <a:solidFill>
+                  <a:srgbClr val="C00000"/>
+                </a:solidFill>
+              </a:endParaRPr>
+            </a:p>
+          </p:txBody>
+        </p:sp>
+        <p:cxnSp>
+          <p:nvCxnSpPr>
+            <p:cNvPr id="41" name="Straight Connector 40">
+              <a:extLst>
+                <a:ext uri="{FF2B5EF4-FFF2-40B4-BE49-F238E27FC236}">
+                  <a16:creationId xmlns:a16="http://schemas.microsoft.com/office/drawing/2014/main" id="{CF291CC0-2017-41CF-9EC8-4563A1B83FF7}"/>
+                </a:ext>
+              </a:extLst>
+            </p:cNvPr>
+            <p:cNvCxnSpPr>
+              <a:cxnSpLocks/>
+              <a:stCxn id="40" idx="1"/>
+              <a:endCxn id="40" idx="5"/>
+            </p:cNvCxnSpPr>
+            <p:nvPr/>
+          </p:nvCxnSpPr>
+          <p:spPr>
+            <a:xfrm>
+              <a:off x="279247" y="386486"/>
+              <a:ext cx="646578" cy="646577"/>
+            </a:xfrm>
+            <a:prstGeom prst="line">
+              <a:avLst/>
+            </a:prstGeom>
+            <a:ln w="57150">
+              <a:solidFill>
+                <a:srgbClr val="C00000"/>
+              </a:solidFill>
+            </a:ln>
+          </p:spPr>
+          <p:style>
+            <a:lnRef idx="1">
+              <a:schemeClr val="accent1"/>
+            </a:lnRef>
+            <a:fillRef idx="0">
+              <a:schemeClr val="accent1"/>
+            </a:fillRef>
+            <a:effectRef idx="0">
+              <a:schemeClr val="accent1"/>
+            </a:effectRef>
+            <a:fontRef idx="minor">
+              <a:schemeClr val="tx1"/>
+            </a:fontRef>
+          </p:style>
+        </p:cxnSp>
+      </p:grpSp>
+      <p:grpSp>
+        <p:nvGrpSpPr>
+          <p:cNvPr id="22" name="Group 21">
+            <a:extLst>
+              <a:ext uri="{FF2B5EF4-FFF2-40B4-BE49-F238E27FC236}">
+                <a16:creationId xmlns:a16="http://schemas.microsoft.com/office/drawing/2014/main" id="{995F7F6F-44BB-49BD-BB6E-79CABCF9C39C}"/>
+              </a:ext>
+            </a:extLst>
+          </p:cNvPr>
+          <p:cNvGrpSpPr/>
+          <p:nvPr/>
+        </p:nvGrpSpPr>
+        <p:grpSpPr>
+          <a:xfrm>
+            <a:off x="9056642" y="436226"/>
+            <a:ext cx="2908626" cy="914400"/>
+            <a:chOff x="5069739" y="3102746"/>
+            <a:chExt cx="2908626" cy="914400"/>
+          </a:xfrm>
+        </p:grpSpPr>
+        <p:pic>
+          <p:nvPicPr>
+            <p:cNvPr id="128" name="Picture 127" descr="Diagram&#10;&#10;Description automatically generated">
+              <a:extLst>
+                <a:ext uri="{FF2B5EF4-FFF2-40B4-BE49-F238E27FC236}">
+                  <a16:creationId xmlns:a16="http://schemas.microsoft.com/office/drawing/2014/main" id="{841E2CB1-61D6-420B-9BDF-CE179CEF1C5C}"/>
+                </a:ext>
+              </a:extLst>
+            </p:cNvPr>
+            <p:cNvPicPr>
+              <a:picLocks noChangeAspect="1"/>
+            </p:cNvPicPr>
+            <p:nvPr/>
+          </p:nvPicPr>
+          <p:blipFill>
+            <a:blip r:embed="rId14">
+              <a:extLst>
+                <a:ext uri="{28A0092B-C50C-407E-A947-70E740481C1C}">
+                  <a14:useLocalDpi xmlns:a14="http://schemas.microsoft.com/office/drawing/2010/main" val="0"/>
+                </a:ext>
+              </a:extLst>
+            </a:blip>
+            <a:stretch>
+              <a:fillRect/>
+            </a:stretch>
+          </p:blipFill>
+          <p:spPr>
+            <a:xfrm>
+              <a:off x="5069739" y="3102746"/>
+              <a:ext cx="902764" cy="902764"/>
+            </a:xfrm>
+            <a:prstGeom prst="rect">
+              <a:avLst/>
+            </a:prstGeom>
+          </p:spPr>
+        </p:pic>
+        <p:pic>
+          <p:nvPicPr>
+            <p:cNvPr id="51" name="Picture 50" descr="Diagram&#10;&#10;Description automatically generated">
+              <a:extLst>
+                <a:ext uri="{FF2B5EF4-FFF2-40B4-BE49-F238E27FC236}">
+                  <a16:creationId xmlns:a16="http://schemas.microsoft.com/office/drawing/2014/main" id="{A9D9DAF6-8ADF-4AEF-9E58-79CB2F7E8208}"/>
+                </a:ext>
+              </a:extLst>
+            </p:cNvPr>
+            <p:cNvPicPr>
+              <a:picLocks noChangeAspect="1"/>
+            </p:cNvPicPr>
+            <p:nvPr/>
+          </p:nvPicPr>
+          <p:blipFill>
+            <a:blip r:embed="rId14">
+              <a:extLst>
+                <a:ext uri="{28A0092B-C50C-407E-A947-70E740481C1C}">
+                  <a14:useLocalDpi xmlns:a14="http://schemas.microsoft.com/office/drawing/2010/main" val="0"/>
+                </a:ext>
+              </a:extLst>
+            </a:blip>
+            <a:stretch>
+              <a:fillRect/>
+            </a:stretch>
+          </p:blipFill>
+          <p:spPr>
+            <a:xfrm>
+              <a:off x="6072670" y="3114382"/>
+              <a:ext cx="902764" cy="902764"/>
+            </a:xfrm>
+            <a:prstGeom prst="rect">
+              <a:avLst/>
+            </a:prstGeom>
+          </p:spPr>
+        </p:pic>
+        <p:pic>
+          <p:nvPicPr>
+            <p:cNvPr id="53" name="Picture 52" descr="Diagram&#10;&#10;Description automatically generated">
+              <a:extLst>
+                <a:ext uri="{FF2B5EF4-FFF2-40B4-BE49-F238E27FC236}">
+                  <a16:creationId xmlns:a16="http://schemas.microsoft.com/office/drawing/2014/main" id="{716FFA13-5285-4087-AAF2-1630B1B0FF5E}"/>
+                </a:ext>
+              </a:extLst>
+            </p:cNvPr>
+            <p:cNvPicPr>
+              <a:picLocks noChangeAspect="1"/>
+            </p:cNvPicPr>
+            <p:nvPr/>
+          </p:nvPicPr>
+          <p:blipFill>
+            <a:blip r:embed="rId14">
+              <a:extLst>
+                <a:ext uri="{28A0092B-C50C-407E-A947-70E740481C1C}">
+                  <a14:useLocalDpi xmlns:a14="http://schemas.microsoft.com/office/drawing/2010/main" val="0"/>
+                </a:ext>
+              </a:extLst>
+            </a:blip>
+            <a:stretch>
+              <a:fillRect/>
+            </a:stretch>
+          </p:blipFill>
+          <p:spPr>
+            <a:xfrm>
+              <a:off x="7075601" y="3114382"/>
+              <a:ext cx="902764" cy="902764"/>
+            </a:xfrm>
+            <a:prstGeom prst="rect">
+              <a:avLst/>
+            </a:prstGeom>
+          </p:spPr>
+        </p:pic>
+      </p:grpSp>
+      <p:grpSp>
+        <p:nvGrpSpPr>
+          <p:cNvPr id="25" name="Group 24">
+            <a:extLst>
+              <a:ext uri="{FF2B5EF4-FFF2-40B4-BE49-F238E27FC236}">
+                <a16:creationId xmlns:a16="http://schemas.microsoft.com/office/drawing/2014/main" id="{F1DA55A2-1C05-46FF-B03A-5936B63E2D6C}"/>
+              </a:ext>
+            </a:extLst>
+          </p:cNvPr>
+          <p:cNvGrpSpPr>
+            <a:grpSpLocks noChangeAspect="1"/>
+          </p:cNvGrpSpPr>
+          <p:nvPr/>
+        </p:nvGrpSpPr>
+        <p:grpSpPr>
+          <a:xfrm>
+            <a:off x="4765446" y="2200132"/>
+            <a:ext cx="2183476" cy="1463040"/>
+            <a:chOff x="4765446" y="2200132"/>
+            <a:chExt cx="2729346" cy="1828800"/>
+          </a:xfrm>
+        </p:grpSpPr>
+        <p:pic>
+          <p:nvPicPr>
+            <p:cNvPr id="27" name="Picture 26">
+              <a:extLst>
+                <a:ext uri="{FF2B5EF4-FFF2-40B4-BE49-F238E27FC236}">
+                  <a16:creationId xmlns:a16="http://schemas.microsoft.com/office/drawing/2014/main" id="{238F7468-6141-4077-B9BC-3FC6A2771B9D}"/>
+                </a:ext>
+              </a:extLst>
+            </p:cNvPr>
+            <p:cNvPicPr/>
+            <p:nvPr/>
+          </p:nvPicPr>
+          <p:blipFill>
+            <a:blip r:embed="rId10">
+              <a:duotone>
+                <a:schemeClr val="accent6">
+                  <a:shade val="45000"/>
+                  <a:satMod val="135000"/>
+                </a:schemeClr>
+                <a:prstClr val="white"/>
+              </a:duotone>
+              <a:extLst>
+                <a:ext uri="{28A0092B-C50C-407E-A947-70E740481C1C}">
+                  <a14:useLocalDpi xmlns:a14="http://schemas.microsoft.com/office/drawing/2010/main" val="0"/>
+                </a:ext>
+              </a:extLst>
+            </a:blip>
+            <a:srcRect/>
+            <a:stretch>
+              <a:fillRect/>
+            </a:stretch>
+          </p:blipFill>
+          <p:spPr bwMode="auto">
+            <a:xfrm>
+              <a:off x="4765446" y="2200132"/>
+              <a:ext cx="914400" cy="914400"/>
+            </a:xfrm>
+            <a:prstGeom prst="rect">
+              <a:avLst/>
+            </a:prstGeom>
+            <a:noFill/>
+          </p:spPr>
+        </p:pic>
+        <p:pic>
+          <p:nvPicPr>
+            <p:cNvPr id="45" name="Picture 44">
+              <a:extLst>
+                <a:ext uri="{FF2B5EF4-FFF2-40B4-BE49-F238E27FC236}">
+                  <a16:creationId xmlns:a16="http://schemas.microsoft.com/office/drawing/2014/main" id="{C1B68427-EABB-4B1F-91B9-498E71405294}"/>
+                </a:ext>
+              </a:extLst>
+            </p:cNvPr>
+            <p:cNvPicPr/>
+            <p:nvPr/>
+          </p:nvPicPr>
+          <p:blipFill>
+            <a:blip r:embed="rId10">
+              <a:duotone>
+                <a:schemeClr val="accent6">
+                  <a:shade val="45000"/>
+                  <a:satMod val="135000"/>
+                </a:schemeClr>
+                <a:prstClr val="white"/>
+              </a:duotone>
+              <a:extLst>
+                <a:ext uri="{28A0092B-C50C-407E-A947-70E740481C1C}">
+                  <a14:useLocalDpi xmlns:a14="http://schemas.microsoft.com/office/drawing/2010/main" val="0"/>
+                </a:ext>
+              </a:extLst>
+            </a:blip>
+            <a:srcRect/>
+            <a:stretch>
+              <a:fillRect/>
+            </a:stretch>
+          </p:blipFill>
+          <p:spPr bwMode="auto">
+            <a:xfrm>
+              <a:off x="5679846" y="2200132"/>
+              <a:ext cx="914400" cy="914400"/>
+            </a:xfrm>
+            <a:prstGeom prst="rect">
+              <a:avLst/>
+            </a:prstGeom>
+            <a:noFill/>
+          </p:spPr>
+        </p:pic>
+        <p:pic>
+          <p:nvPicPr>
+            <p:cNvPr id="47" name="Picture 46">
+              <a:extLst>
+                <a:ext uri="{FF2B5EF4-FFF2-40B4-BE49-F238E27FC236}">
+                  <a16:creationId xmlns:a16="http://schemas.microsoft.com/office/drawing/2014/main" id="{1803591C-403C-4847-9045-F86348C940E1}"/>
+                </a:ext>
+              </a:extLst>
+            </p:cNvPr>
+            <p:cNvPicPr/>
+            <p:nvPr/>
+          </p:nvPicPr>
+          <p:blipFill>
+            <a:blip r:embed="rId10">
+              <a:duotone>
+                <a:schemeClr val="accent6">
+                  <a:shade val="45000"/>
+                  <a:satMod val="135000"/>
+                </a:schemeClr>
+                <a:prstClr val="white"/>
+              </a:duotone>
+              <a:extLst>
+                <a:ext uri="{28A0092B-C50C-407E-A947-70E740481C1C}">
+                  <a14:useLocalDpi xmlns:a14="http://schemas.microsoft.com/office/drawing/2010/main" val="0"/>
+                </a:ext>
+              </a:extLst>
+            </a:blip>
+            <a:srcRect/>
+            <a:stretch>
+              <a:fillRect/>
+            </a:stretch>
+          </p:blipFill>
+          <p:spPr bwMode="auto">
+            <a:xfrm>
+              <a:off x="6580392" y="2200132"/>
+              <a:ext cx="914400" cy="914400"/>
+            </a:xfrm>
+            <a:prstGeom prst="rect">
+              <a:avLst/>
+            </a:prstGeom>
+            <a:noFill/>
+          </p:spPr>
+        </p:pic>
+        <p:pic>
+          <p:nvPicPr>
+            <p:cNvPr id="48" name="Picture 47">
+              <a:extLst>
+                <a:ext uri="{FF2B5EF4-FFF2-40B4-BE49-F238E27FC236}">
+                  <a16:creationId xmlns:a16="http://schemas.microsoft.com/office/drawing/2014/main" id="{FEB8193C-4177-4AD8-9F10-0BB2DDD4330A}"/>
+                </a:ext>
+              </a:extLst>
+            </p:cNvPr>
+            <p:cNvPicPr/>
+            <p:nvPr/>
+          </p:nvPicPr>
+          <p:blipFill>
+            <a:blip r:embed="rId10">
+              <a:duotone>
+                <a:schemeClr val="accent6">
+                  <a:shade val="45000"/>
+                  <a:satMod val="135000"/>
+                </a:schemeClr>
+                <a:prstClr val="white"/>
+              </a:duotone>
+              <a:extLst>
+                <a:ext uri="{28A0092B-C50C-407E-A947-70E740481C1C}">
+                  <a14:useLocalDpi xmlns:a14="http://schemas.microsoft.com/office/drawing/2010/main" val="0"/>
+                </a:ext>
+              </a:extLst>
+            </a:blip>
+            <a:srcRect/>
+            <a:stretch>
+              <a:fillRect/>
+            </a:stretch>
+          </p:blipFill>
+          <p:spPr bwMode="auto">
+            <a:xfrm>
+              <a:off x="4765446" y="3114532"/>
+              <a:ext cx="914400" cy="914400"/>
+            </a:xfrm>
+            <a:prstGeom prst="rect">
+              <a:avLst/>
+            </a:prstGeom>
+            <a:noFill/>
+          </p:spPr>
+        </p:pic>
+        <p:pic>
+          <p:nvPicPr>
+            <p:cNvPr id="49" name="Picture 48">
+              <a:extLst>
+                <a:ext uri="{FF2B5EF4-FFF2-40B4-BE49-F238E27FC236}">
+                  <a16:creationId xmlns:a16="http://schemas.microsoft.com/office/drawing/2014/main" id="{C6EEA019-6113-45D4-B21E-6ED0255A1001}"/>
+                </a:ext>
+              </a:extLst>
+            </p:cNvPr>
+            <p:cNvPicPr/>
+            <p:nvPr/>
+          </p:nvPicPr>
+          <p:blipFill>
+            <a:blip r:embed="rId10">
+              <a:duotone>
+                <a:schemeClr val="accent6">
+                  <a:shade val="45000"/>
+                  <a:satMod val="135000"/>
+                </a:schemeClr>
+                <a:prstClr val="white"/>
+              </a:duotone>
+              <a:extLst>
+                <a:ext uri="{28A0092B-C50C-407E-A947-70E740481C1C}">
+                  <a14:useLocalDpi xmlns:a14="http://schemas.microsoft.com/office/drawing/2010/main" val="0"/>
+                </a:ext>
+              </a:extLst>
+            </a:blip>
+            <a:srcRect/>
+            <a:stretch>
+              <a:fillRect/>
+            </a:stretch>
+          </p:blipFill>
+          <p:spPr bwMode="auto">
+            <a:xfrm>
+              <a:off x="5679846" y="3114532"/>
+              <a:ext cx="914400" cy="914400"/>
+            </a:xfrm>
+            <a:prstGeom prst="rect">
+              <a:avLst/>
+            </a:prstGeom>
+            <a:noFill/>
+          </p:spPr>
+        </p:pic>
+        <p:pic>
+          <p:nvPicPr>
+            <p:cNvPr id="50" name="Picture 49">
+              <a:extLst>
+                <a:ext uri="{FF2B5EF4-FFF2-40B4-BE49-F238E27FC236}">
+                  <a16:creationId xmlns:a16="http://schemas.microsoft.com/office/drawing/2014/main" id="{CD96600D-4256-440D-815E-5ED40F9B5808}"/>
+                </a:ext>
+              </a:extLst>
+            </p:cNvPr>
+            <p:cNvPicPr/>
+            <p:nvPr/>
+          </p:nvPicPr>
+          <p:blipFill>
+            <a:blip r:embed="rId10">
+              <a:duotone>
+                <a:schemeClr val="accent6">
+                  <a:shade val="45000"/>
+                  <a:satMod val="135000"/>
+                </a:schemeClr>
+                <a:prstClr val="white"/>
+              </a:duotone>
+              <a:extLst>
+                <a:ext uri="{28A0092B-C50C-407E-A947-70E740481C1C}">
+                  <a14:useLocalDpi xmlns:a14="http://schemas.microsoft.com/office/drawing/2010/main" val="0"/>
+                </a:ext>
+              </a:extLst>
+            </a:blip>
+            <a:srcRect/>
+            <a:stretch>
+              <a:fillRect/>
+            </a:stretch>
+          </p:blipFill>
+          <p:spPr bwMode="auto">
+            <a:xfrm>
+              <a:off x="6580392" y="3114532"/>
+              <a:ext cx="914400" cy="914400"/>
+            </a:xfrm>
+            <a:prstGeom prst="rect">
+              <a:avLst/>
+            </a:prstGeom>
+            <a:noFill/>
+          </p:spPr>
+        </p:pic>
+      </p:grpSp>
+      <p:grpSp>
+        <p:nvGrpSpPr>
+          <p:cNvPr id="24" name="Group 23">
+            <a:extLst>
+              <a:ext uri="{FF2B5EF4-FFF2-40B4-BE49-F238E27FC236}">
+                <a16:creationId xmlns:a16="http://schemas.microsoft.com/office/drawing/2014/main" id="{9C4E7AC9-4C87-4999-9C79-19B9D4C36C1B}"/>
+              </a:ext>
+            </a:extLst>
+          </p:cNvPr>
+          <p:cNvGrpSpPr>
+            <a:grpSpLocks noChangeAspect="1"/>
+          </p:cNvGrpSpPr>
+          <p:nvPr/>
+        </p:nvGrpSpPr>
+        <p:grpSpPr>
+          <a:xfrm>
+            <a:off x="4761533" y="4057010"/>
+            <a:ext cx="2184456" cy="1463040"/>
+            <a:chOff x="4816520" y="2943114"/>
+            <a:chExt cx="2687782" cy="1800143"/>
+          </a:xfrm>
+        </p:grpSpPr>
+        <p:pic>
+          <p:nvPicPr>
+            <p:cNvPr id="39" name="Picture 38">
+              <a:extLst>
+                <a:ext uri="{FF2B5EF4-FFF2-40B4-BE49-F238E27FC236}">
+                  <a16:creationId xmlns:a16="http://schemas.microsoft.com/office/drawing/2014/main" id="{0BDA2181-5489-4750-9DC3-D456B9F16A40}"/>
+                </a:ext>
+              </a:extLst>
+            </p:cNvPr>
+            <p:cNvPicPr/>
+            <p:nvPr/>
+          </p:nvPicPr>
+          <p:blipFill>
+            <a:blip r:embed="rId10">
+              <a:duotone>
+                <a:schemeClr val="accent5">
+                  <a:shade val="45000"/>
+                  <a:satMod val="135000"/>
+                </a:schemeClr>
+                <a:prstClr val="white"/>
+              </a:duotone>
+              <a:extLst>
+                <a:ext uri="{28A0092B-C50C-407E-A947-70E740481C1C}">
+                  <a14:useLocalDpi xmlns:a14="http://schemas.microsoft.com/office/drawing/2010/main" val="0"/>
+                </a:ext>
+              </a:extLst>
+            </a:blip>
+            <a:srcRect/>
+            <a:stretch>
+              <a:fillRect/>
+            </a:stretch>
+          </p:blipFill>
+          <p:spPr bwMode="auto">
+            <a:xfrm>
+              <a:off x="4816520" y="2943114"/>
+              <a:ext cx="914400" cy="914400"/>
+            </a:xfrm>
+            <a:prstGeom prst="rect">
+              <a:avLst/>
+            </a:prstGeom>
+            <a:noFill/>
+          </p:spPr>
+        </p:pic>
+        <p:pic>
+          <p:nvPicPr>
+            <p:cNvPr id="52" name="Picture 51">
+              <a:extLst>
+                <a:ext uri="{FF2B5EF4-FFF2-40B4-BE49-F238E27FC236}">
+                  <a16:creationId xmlns:a16="http://schemas.microsoft.com/office/drawing/2014/main" id="{6CB6F775-093D-43E1-B352-EDDB0469064D}"/>
+                </a:ext>
+              </a:extLst>
+            </p:cNvPr>
+            <p:cNvPicPr/>
+            <p:nvPr/>
+          </p:nvPicPr>
+          <p:blipFill>
+            <a:blip r:embed="rId10">
+              <a:duotone>
+                <a:schemeClr val="accent5">
+                  <a:shade val="45000"/>
+                  <a:satMod val="135000"/>
+                </a:schemeClr>
+                <a:prstClr val="white"/>
+              </a:duotone>
+              <a:extLst>
+                <a:ext uri="{28A0092B-C50C-407E-A947-70E740481C1C}">
+                  <a14:useLocalDpi xmlns:a14="http://schemas.microsoft.com/office/drawing/2010/main" val="0"/>
+                </a:ext>
+              </a:extLst>
+            </a:blip>
+            <a:srcRect/>
+            <a:stretch>
+              <a:fillRect/>
+            </a:stretch>
+          </p:blipFill>
+          <p:spPr bwMode="auto">
+            <a:xfrm>
+              <a:off x="5703211" y="2943114"/>
+              <a:ext cx="914400" cy="914400"/>
+            </a:xfrm>
+            <a:prstGeom prst="rect">
+              <a:avLst/>
+            </a:prstGeom>
+            <a:noFill/>
+          </p:spPr>
+        </p:pic>
+        <p:pic>
+          <p:nvPicPr>
+            <p:cNvPr id="54" name="Picture 53">
+              <a:extLst>
+                <a:ext uri="{FF2B5EF4-FFF2-40B4-BE49-F238E27FC236}">
+                  <a16:creationId xmlns:a16="http://schemas.microsoft.com/office/drawing/2014/main" id="{D5556944-0D7C-4351-BE59-0D6D6314D25B}"/>
+                </a:ext>
+              </a:extLst>
+            </p:cNvPr>
+            <p:cNvPicPr/>
+            <p:nvPr/>
+          </p:nvPicPr>
+          <p:blipFill>
+            <a:blip r:embed="rId10">
+              <a:duotone>
+                <a:schemeClr val="accent5">
+                  <a:shade val="45000"/>
+                  <a:satMod val="135000"/>
+                </a:schemeClr>
+                <a:prstClr val="white"/>
+              </a:duotone>
+              <a:extLst>
+                <a:ext uri="{28A0092B-C50C-407E-A947-70E740481C1C}">
+                  <a14:useLocalDpi xmlns:a14="http://schemas.microsoft.com/office/drawing/2010/main" val="0"/>
+                </a:ext>
+              </a:extLst>
+            </a:blip>
+            <a:srcRect/>
+            <a:stretch>
+              <a:fillRect/>
+            </a:stretch>
+          </p:blipFill>
+          <p:spPr bwMode="auto">
+            <a:xfrm>
+              <a:off x="6589902" y="2956085"/>
+              <a:ext cx="914400" cy="914400"/>
+            </a:xfrm>
+            <a:prstGeom prst="rect">
+              <a:avLst/>
+            </a:prstGeom>
+            <a:noFill/>
+          </p:spPr>
+        </p:pic>
+        <p:pic>
+          <p:nvPicPr>
+            <p:cNvPr id="55" name="Picture 54">
+              <a:extLst>
+                <a:ext uri="{FF2B5EF4-FFF2-40B4-BE49-F238E27FC236}">
+                  <a16:creationId xmlns:a16="http://schemas.microsoft.com/office/drawing/2014/main" id="{D9FD1C5E-0F54-430B-8077-2858938E1A4D}"/>
+                </a:ext>
+              </a:extLst>
+            </p:cNvPr>
+            <p:cNvPicPr/>
+            <p:nvPr/>
+          </p:nvPicPr>
+          <p:blipFill>
+            <a:blip r:embed="rId10">
+              <a:duotone>
+                <a:schemeClr val="accent5">
+                  <a:shade val="45000"/>
+                  <a:satMod val="135000"/>
+                </a:schemeClr>
+                <a:prstClr val="white"/>
+              </a:duotone>
+              <a:extLst>
+                <a:ext uri="{28A0092B-C50C-407E-A947-70E740481C1C}">
+                  <a14:useLocalDpi xmlns:a14="http://schemas.microsoft.com/office/drawing/2010/main" val="0"/>
+                </a:ext>
+              </a:extLst>
+            </a:blip>
+            <a:srcRect/>
+            <a:stretch>
+              <a:fillRect/>
+            </a:stretch>
+          </p:blipFill>
+          <p:spPr bwMode="auto">
+            <a:xfrm>
+              <a:off x="4816520" y="3815886"/>
+              <a:ext cx="914400" cy="914400"/>
+            </a:xfrm>
+            <a:prstGeom prst="rect">
+              <a:avLst/>
+            </a:prstGeom>
+            <a:noFill/>
+          </p:spPr>
+        </p:pic>
+        <p:pic>
+          <p:nvPicPr>
+            <p:cNvPr id="56" name="Picture 55">
+              <a:extLst>
+                <a:ext uri="{FF2B5EF4-FFF2-40B4-BE49-F238E27FC236}">
+                  <a16:creationId xmlns:a16="http://schemas.microsoft.com/office/drawing/2014/main" id="{973A3D41-8300-4E35-BA39-1319220000CC}"/>
+                </a:ext>
+              </a:extLst>
+            </p:cNvPr>
+            <p:cNvPicPr/>
+            <p:nvPr/>
+          </p:nvPicPr>
+          <p:blipFill>
+            <a:blip r:embed="rId10">
+              <a:duotone>
+                <a:schemeClr val="accent5">
+                  <a:shade val="45000"/>
+                  <a:satMod val="135000"/>
+                </a:schemeClr>
+                <a:prstClr val="white"/>
+              </a:duotone>
+              <a:extLst>
+                <a:ext uri="{28A0092B-C50C-407E-A947-70E740481C1C}">
+                  <a14:useLocalDpi xmlns:a14="http://schemas.microsoft.com/office/drawing/2010/main" val="0"/>
+                </a:ext>
+              </a:extLst>
+            </a:blip>
+            <a:srcRect/>
+            <a:stretch>
+              <a:fillRect/>
+            </a:stretch>
+          </p:blipFill>
+          <p:spPr bwMode="auto">
+            <a:xfrm>
+              <a:off x="5703211" y="3815886"/>
+              <a:ext cx="914400" cy="914400"/>
+            </a:xfrm>
+            <a:prstGeom prst="rect">
+              <a:avLst/>
+            </a:prstGeom>
+            <a:noFill/>
+          </p:spPr>
+        </p:pic>
+        <p:pic>
+          <p:nvPicPr>
+            <p:cNvPr id="57" name="Picture 56">
+              <a:extLst>
+                <a:ext uri="{FF2B5EF4-FFF2-40B4-BE49-F238E27FC236}">
+                  <a16:creationId xmlns:a16="http://schemas.microsoft.com/office/drawing/2014/main" id="{374ABC82-ACF7-4E6D-B09A-215BF8FA2463}"/>
+                </a:ext>
+              </a:extLst>
+            </p:cNvPr>
+            <p:cNvPicPr/>
+            <p:nvPr/>
+          </p:nvPicPr>
+          <p:blipFill>
+            <a:blip r:embed="rId10">
+              <a:duotone>
+                <a:schemeClr val="accent5">
+                  <a:shade val="45000"/>
+                  <a:satMod val="135000"/>
+                </a:schemeClr>
+                <a:prstClr val="white"/>
+              </a:duotone>
+              <a:extLst>
+                <a:ext uri="{28A0092B-C50C-407E-A947-70E740481C1C}">
+                  <a14:useLocalDpi xmlns:a14="http://schemas.microsoft.com/office/drawing/2010/main" val="0"/>
+                </a:ext>
+              </a:extLst>
+            </a:blip>
+            <a:srcRect/>
+            <a:stretch>
+              <a:fillRect/>
+            </a:stretch>
+          </p:blipFill>
+          <p:spPr bwMode="auto">
+            <a:xfrm>
+              <a:off x="6589902" y="3828857"/>
+              <a:ext cx="914400" cy="914400"/>
+            </a:xfrm>
+            <a:prstGeom prst="rect">
+              <a:avLst/>
+            </a:prstGeom>
+            <a:noFill/>
+          </p:spPr>
+        </p:pic>
       </p:grpSp>
     </p:spTree>
     <p:extLst>

</xml_diff>